<commit_message>
it's never final, is it?...
</commit_message>
<xml_diff>
--- a/Prezentacija.pptx
+++ b/Prezentacija.pptx
@@ -120,7 +120,7 @@
   </p:defaultTextStyle>
   <p:extLst>
     <p:ext uri="{EFAFB233-063F-42B5-8137-9DF3F51BA10A}">
-      <p15:sldGuideLst xmlns:p15="http://schemas.microsoft.com/office/powerpoint/2012/main"/>
+      <p15:sldGuideLst xmlns="" xmlns:p15="http://schemas.microsoft.com/office/powerpoint/2012/main"/>
     </p:ext>
   </p:extLst>
 </p:presentation>
@@ -638,7 +638,7 @@
             <a:fld id="{B61BEF0D-F0BB-DE4B-95CE-6DB70DBA9567}" type="datetimeFigureOut">
               <a:rPr lang="en-US" dirty="0"/>
               <a:pPr/>
-              <a:t>5/24/2023</a:t>
+              <a:t>5/31/2023</a:t>
             </a:fld>
             <a:endParaRPr lang="en-US" dirty="0"/>
           </a:p>
@@ -695,7 +695,7 @@
     </p:spTree>
     <p:extLst>
       <p:ext uri="{BB962C8B-B14F-4D97-AF65-F5344CB8AC3E}">
-        <p14:creationId xmlns:p14="http://schemas.microsoft.com/office/powerpoint/2010/main" val="1357317731"/>
+        <p14:creationId xmlns="" xmlns:p14="http://schemas.microsoft.com/office/powerpoint/2010/main" val="1357317731"/>
       </p:ext>
     </p:extLst>
   </p:cSld>
@@ -931,7 +931,7 @@
             <a:fld id="{B61BEF0D-F0BB-DE4B-95CE-6DB70DBA9567}" type="datetimeFigureOut">
               <a:rPr lang="en-US" dirty="0"/>
               <a:pPr/>
-              <a:t>5/24/2023</a:t>
+              <a:t>5/31/2023</a:t>
             </a:fld>
             <a:endParaRPr lang="en-US" dirty="0"/>
           </a:p>
@@ -983,7 +983,7 @@
     </p:spTree>
     <p:extLst>
       <p:ext uri="{BB962C8B-B14F-4D97-AF65-F5344CB8AC3E}">
-        <p14:creationId xmlns:p14="http://schemas.microsoft.com/office/powerpoint/2010/main" val="2054546423"/>
+        <p14:creationId xmlns="" xmlns:p14="http://schemas.microsoft.com/office/powerpoint/2010/main" val="2054546423"/>
       </p:ext>
     </p:extLst>
   </p:cSld>
@@ -1180,7 +1180,7 @@
             <a:fld id="{B61BEF0D-F0BB-DE4B-95CE-6DB70DBA9567}" type="datetimeFigureOut">
               <a:rPr lang="en-US" dirty="0"/>
               <a:pPr/>
-              <a:t>5/24/2023</a:t>
+              <a:t>5/31/2023</a:t>
             </a:fld>
             <a:endParaRPr lang="en-US" dirty="0"/>
           </a:p>
@@ -1232,7 +1232,7 @@
     </p:spTree>
     <p:extLst>
       <p:ext uri="{BB962C8B-B14F-4D97-AF65-F5344CB8AC3E}">
-        <p14:creationId xmlns:p14="http://schemas.microsoft.com/office/powerpoint/2010/main" val="3644881479"/>
+        <p14:creationId xmlns="" xmlns:p14="http://schemas.microsoft.com/office/powerpoint/2010/main" val="3644881479"/>
       </p:ext>
     </p:extLst>
   </p:cSld>
@@ -1721,7 +1721,7 @@
             <a:fld id="{B61BEF0D-F0BB-DE4B-95CE-6DB70DBA9567}" type="datetimeFigureOut">
               <a:rPr lang="en-US" dirty="0"/>
               <a:pPr/>
-              <a:t>5/24/2023</a:t>
+              <a:t>5/31/2023</a:t>
             </a:fld>
             <a:endParaRPr lang="en-US" dirty="0"/>
           </a:p>
@@ -1773,7 +1773,7 @@
     </p:spTree>
     <p:extLst>
       <p:ext uri="{BB962C8B-B14F-4D97-AF65-F5344CB8AC3E}">
-        <p14:creationId xmlns:p14="http://schemas.microsoft.com/office/powerpoint/2010/main" val="63939811"/>
+        <p14:creationId xmlns="" xmlns:p14="http://schemas.microsoft.com/office/powerpoint/2010/main" val="63939811"/>
       </p:ext>
     </p:extLst>
   </p:cSld>
@@ -1970,7 +1970,7 @@
             <a:fld id="{B61BEF0D-F0BB-DE4B-95CE-6DB70DBA9567}" type="datetimeFigureOut">
               <a:rPr lang="en-US" dirty="0"/>
               <a:pPr/>
-              <a:t>5/24/2023</a:t>
+              <a:t>5/31/2023</a:t>
             </a:fld>
             <a:endParaRPr lang="en-US" dirty="0"/>
           </a:p>
@@ -2022,7 +2022,7 @@
     </p:spTree>
     <p:extLst>
       <p:ext uri="{BB962C8B-B14F-4D97-AF65-F5344CB8AC3E}">
-        <p14:creationId xmlns:p14="http://schemas.microsoft.com/office/powerpoint/2010/main" val="2216785368"/>
+        <p14:creationId xmlns="" xmlns:p14="http://schemas.microsoft.com/office/powerpoint/2010/main" val="2216785368"/>
       </p:ext>
     </p:extLst>
   </p:cSld>
@@ -2503,7 +2503,7 @@
             <a:fld id="{B61BEF0D-F0BB-DE4B-95CE-6DB70DBA9567}" type="datetimeFigureOut">
               <a:rPr lang="en-US" dirty="0"/>
               <a:pPr/>
-              <a:t>5/24/2023</a:t>
+              <a:t>5/31/2023</a:t>
             </a:fld>
             <a:endParaRPr lang="en-US" dirty="0"/>
           </a:p>
@@ -2555,7 +2555,7 @@
     </p:spTree>
     <p:extLst>
       <p:ext uri="{BB962C8B-B14F-4D97-AF65-F5344CB8AC3E}">
-        <p14:creationId xmlns:p14="http://schemas.microsoft.com/office/powerpoint/2010/main" val="1702216911"/>
+        <p14:creationId xmlns="" xmlns:p14="http://schemas.microsoft.com/office/powerpoint/2010/main" val="1702216911"/>
       </p:ext>
     </p:extLst>
   </p:cSld>
@@ -2801,7 +2801,7 @@
             <a:fld id="{B61BEF0D-F0BB-DE4B-95CE-6DB70DBA9567}" type="datetimeFigureOut">
               <a:rPr lang="en-US" dirty="0"/>
               <a:pPr/>
-              <a:t>5/24/2023</a:t>
+              <a:t>5/31/2023</a:t>
             </a:fld>
             <a:endParaRPr lang="en-US" dirty="0"/>
           </a:p>
@@ -2853,7 +2853,7 @@
     </p:spTree>
     <p:extLst>
       <p:ext uri="{BB962C8B-B14F-4D97-AF65-F5344CB8AC3E}">
-        <p14:creationId xmlns:p14="http://schemas.microsoft.com/office/powerpoint/2010/main" val="3767067204"/>
+        <p14:creationId xmlns="" xmlns:p14="http://schemas.microsoft.com/office/powerpoint/2010/main" val="3767067204"/>
       </p:ext>
     </p:extLst>
   </p:cSld>
@@ -2975,7 +2975,7 @@
             <a:fld id="{B61BEF0D-F0BB-DE4B-95CE-6DB70DBA9567}" type="datetimeFigureOut">
               <a:rPr lang="en-US" dirty="0"/>
               <a:pPr/>
-              <a:t>5/24/2023</a:t>
+              <a:t>5/31/2023</a:t>
             </a:fld>
             <a:endParaRPr lang="en-US" dirty="0"/>
           </a:p>
@@ -3027,7 +3027,7 @@
     </p:spTree>
     <p:extLst>
       <p:ext uri="{BB962C8B-B14F-4D97-AF65-F5344CB8AC3E}">
-        <p14:creationId xmlns:p14="http://schemas.microsoft.com/office/powerpoint/2010/main" val="664622735"/>
+        <p14:creationId xmlns="" xmlns:p14="http://schemas.microsoft.com/office/powerpoint/2010/main" val="664622735"/>
       </p:ext>
     </p:extLst>
   </p:cSld>
@@ -3155,7 +3155,7 @@
             <a:fld id="{B61BEF0D-F0BB-DE4B-95CE-6DB70DBA9567}" type="datetimeFigureOut">
               <a:rPr lang="en-US" dirty="0"/>
               <a:pPr/>
-              <a:t>5/24/2023</a:t>
+              <a:t>5/31/2023</a:t>
             </a:fld>
             <a:endParaRPr lang="en-US" dirty="0"/>
           </a:p>
@@ -3207,7 +3207,7 @@
     </p:spTree>
     <p:extLst>
       <p:ext uri="{BB962C8B-B14F-4D97-AF65-F5344CB8AC3E}">
-        <p14:creationId xmlns:p14="http://schemas.microsoft.com/office/powerpoint/2010/main" val="1041929094"/>
+        <p14:creationId xmlns="" xmlns:p14="http://schemas.microsoft.com/office/powerpoint/2010/main" val="1041929094"/>
       </p:ext>
     </p:extLst>
   </p:cSld>
@@ -3325,7 +3325,7 @@
             <a:fld id="{B61BEF0D-F0BB-DE4B-95CE-6DB70DBA9567}" type="datetimeFigureOut">
               <a:rPr lang="en-US" dirty="0"/>
               <a:pPr/>
-              <a:t>5/24/2023</a:t>
+              <a:t>5/31/2023</a:t>
             </a:fld>
             <a:endParaRPr lang="en-US" dirty="0"/>
           </a:p>
@@ -3382,7 +3382,7 @@
     </p:spTree>
     <p:extLst>
       <p:ext uri="{BB962C8B-B14F-4D97-AF65-F5344CB8AC3E}">
-        <p14:creationId xmlns:p14="http://schemas.microsoft.com/office/powerpoint/2010/main" val="1603319245"/>
+        <p14:creationId xmlns="" xmlns:p14="http://schemas.microsoft.com/office/powerpoint/2010/main" val="1603319245"/>
       </p:ext>
     </p:extLst>
   </p:cSld>
@@ -3577,7 +3577,7 @@
             <a:fld id="{B61BEF0D-F0BB-DE4B-95CE-6DB70DBA9567}" type="datetimeFigureOut">
               <a:rPr lang="en-US" dirty="0"/>
               <a:pPr/>
-              <a:t>5/24/2023</a:t>
+              <a:t>5/31/2023</a:t>
             </a:fld>
             <a:endParaRPr lang="en-US" dirty="0"/>
           </a:p>
@@ -3629,7 +3629,7 @@
     </p:spTree>
     <p:extLst>
       <p:ext uri="{BB962C8B-B14F-4D97-AF65-F5344CB8AC3E}">
-        <p14:creationId xmlns:p14="http://schemas.microsoft.com/office/powerpoint/2010/main" val="2689237478"/>
+        <p14:creationId xmlns="" xmlns:p14="http://schemas.microsoft.com/office/powerpoint/2010/main" val="2689237478"/>
       </p:ext>
     </p:extLst>
   </p:cSld>
@@ -3873,7 +3873,7 @@
             <a:fld id="{B61BEF0D-F0BB-DE4B-95CE-6DB70DBA9567}" type="datetimeFigureOut">
               <a:rPr lang="en-US" dirty="0"/>
               <a:pPr/>
-              <a:t>5/24/2023</a:t>
+              <a:t>5/31/2023</a:t>
             </a:fld>
             <a:endParaRPr lang="en-US" dirty="0"/>
           </a:p>
@@ -3925,7 +3925,7 @@
     </p:spTree>
     <p:extLst>
       <p:ext uri="{BB962C8B-B14F-4D97-AF65-F5344CB8AC3E}">
-        <p14:creationId xmlns:p14="http://schemas.microsoft.com/office/powerpoint/2010/main" val="1233915514"/>
+        <p14:creationId xmlns="" xmlns:p14="http://schemas.microsoft.com/office/powerpoint/2010/main" val="1233915514"/>
       </p:ext>
     </p:extLst>
   </p:cSld>
@@ -4314,7 +4314,7 @@
             <a:fld id="{B61BEF0D-F0BB-DE4B-95CE-6DB70DBA9567}" type="datetimeFigureOut">
               <a:rPr lang="en-US" dirty="0"/>
               <a:pPr/>
-              <a:t>5/24/2023</a:t>
+              <a:t>5/31/2023</a:t>
             </a:fld>
             <a:endParaRPr lang="en-US" dirty="0"/>
           </a:p>
@@ -4366,7 +4366,7 @@
     </p:spTree>
     <p:extLst>
       <p:ext uri="{BB962C8B-B14F-4D97-AF65-F5344CB8AC3E}">
-        <p14:creationId xmlns:p14="http://schemas.microsoft.com/office/powerpoint/2010/main" val="4172645476"/>
+        <p14:creationId xmlns="" xmlns:p14="http://schemas.microsoft.com/office/powerpoint/2010/main" val="4172645476"/>
       </p:ext>
     </p:extLst>
   </p:cSld>
@@ -4433,7 +4433,7 @@
             <a:fld id="{B61BEF0D-F0BB-DE4B-95CE-6DB70DBA9567}" type="datetimeFigureOut">
               <a:rPr lang="en-US" dirty="0"/>
               <a:pPr/>
-              <a:t>5/24/2023</a:t>
+              <a:t>5/31/2023</a:t>
             </a:fld>
             <a:endParaRPr lang="en-US" dirty="0"/>
           </a:p>
@@ -4485,7 +4485,7 @@
     </p:spTree>
     <p:extLst>
       <p:ext uri="{BB962C8B-B14F-4D97-AF65-F5344CB8AC3E}">
-        <p14:creationId xmlns:p14="http://schemas.microsoft.com/office/powerpoint/2010/main" val="1707617896"/>
+        <p14:creationId xmlns="" xmlns:p14="http://schemas.microsoft.com/office/powerpoint/2010/main" val="1707617896"/>
       </p:ext>
     </p:extLst>
   </p:cSld>
@@ -4530,7 +4530,7 @@
             <a:fld id="{B61BEF0D-F0BB-DE4B-95CE-6DB70DBA9567}" type="datetimeFigureOut">
               <a:rPr lang="en-US" dirty="0"/>
               <a:pPr/>
-              <a:t>5/24/2023</a:t>
+              <a:t>5/31/2023</a:t>
             </a:fld>
             <a:endParaRPr lang="en-US" dirty="0"/>
           </a:p>
@@ -4582,7 +4582,7 @@
     </p:spTree>
     <p:extLst>
       <p:ext uri="{BB962C8B-B14F-4D97-AF65-F5344CB8AC3E}">
-        <p14:creationId xmlns:p14="http://schemas.microsoft.com/office/powerpoint/2010/main" val="3941042978"/>
+        <p14:creationId xmlns="" xmlns:p14="http://schemas.microsoft.com/office/powerpoint/2010/main" val="3941042978"/>
       </p:ext>
     </p:extLst>
   </p:cSld>
@@ -4813,7 +4813,7 @@
             <a:fld id="{B61BEF0D-F0BB-DE4B-95CE-6DB70DBA9567}" type="datetimeFigureOut">
               <a:rPr lang="en-US" dirty="0"/>
               <a:pPr/>
-              <a:t>5/24/2023</a:t>
+              <a:t>5/31/2023</a:t>
             </a:fld>
             <a:endParaRPr lang="en-US" dirty="0"/>
           </a:p>
@@ -4865,7 +4865,7 @@
     </p:spTree>
     <p:extLst>
       <p:ext uri="{BB962C8B-B14F-4D97-AF65-F5344CB8AC3E}">
-        <p14:creationId xmlns:p14="http://schemas.microsoft.com/office/powerpoint/2010/main" val="1286281269"/>
+        <p14:creationId xmlns="" xmlns:p14="http://schemas.microsoft.com/office/powerpoint/2010/main" val="1286281269"/>
       </p:ext>
     </p:extLst>
   </p:cSld>
@@ -5101,7 +5101,7 @@
             <a:fld id="{B61BEF0D-F0BB-DE4B-95CE-6DB70DBA9567}" type="datetimeFigureOut">
               <a:rPr lang="en-US" dirty="0"/>
               <a:pPr/>
-              <a:t>5/24/2023</a:t>
+              <a:t>5/31/2023</a:t>
             </a:fld>
             <a:endParaRPr lang="en-US" dirty="0"/>
           </a:p>
@@ -5153,7 +5153,7 @@
     </p:spTree>
     <p:extLst>
       <p:ext uri="{BB962C8B-B14F-4D97-AF65-F5344CB8AC3E}">
-        <p14:creationId xmlns:p14="http://schemas.microsoft.com/office/powerpoint/2010/main" val="748156006"/>
+        <p14:creationId xmlns="" xmlns:p14="http://schemas.microsoft.com/office/powerpoint/2010/main" val="748156006"/>
       </p:ext>
     </p:extLst>
   </p:cSld>
@@ -5631,7 +5631,7 @@
             <a:fld id="{B61BEF0D-F0BB-DE4B-95CE-6DB70DBA9567}" type="datetimeFigureOut">
               <a:rPr lang="en-US" dirty="0"/>
               <a:pPr/>
-              <a:t>5/24/2023</a:t>
+              <a:t>5/31/2023</a:t>
             </a:fld>
             <a:endParaRPr lang="en-US" dirty="0"/>
           </a:p>
@@ -5719,7 +5719,7 @@
     </p:spTree>
     <p:extLst>
       <p:ext uri="{BB962C8B-B14F-4D97-AF65-F5344CB8AC3E}">
-        <p14:creationId xmlns:p14="http://schemas.microsoft.com/office/powerpoint/2010/main" val="1991401532"/>
+        <p14:creationId xmlns="" xmlns:p14="http://schemas.microsoft.com/office/powerpoint/2010/main" val="1991401532"/>
       </p:ext>
     </p:extLst>
   </p:cSld>
@@ -6168,7 +6168,7 @@
           <p:cNvPr id="2" name="Title 1">
             <a:extLst>
               <a:ext uri="{FF2B5EF4-FFF2-40B4-BE49-F238E27FC236}">
-                <a16:creationId xmlns:a16="http://schemas.microsoft.com/office/drawing/2014/main" id="{30353A91-F7AD-F43A-7DDD-E5579C673DF8}"/>
+                <a16:creationId xmlns="" xmlns:a16="http://schemas.microsoft.com/office/drawing/2014/main" id="{30353A91-F7AD-F43A-7DDD-E5579C673DF8}"/>
               </a:ext>
             </a:extLst>
           </p:cNvPr>
@@ -6218,7 +6218,7 @@
           <p:cNvPr id="3" name="Subtitle 2">
             <a:extLst>
               <a:ext uri="{FF2B5EF4-FFF2-40B4-BE49-F238E27FC236}">
-                <a16:creationId xmlns:a16="http://schemas.microsoft.com/office/drawing/2014/main" id="{B442AB31-2A2C-6B48-4986-A039FD7C021F}"/>
+                <a16:creationId xmlns="" xmlns:a16="http://schemas.microsoft.com/office/drawing/2014/main" id="{B442AB31-2A2C-6B48-4986-A039FD7C021F}"/>
               </a:ext>
             </a:extLst>
           </p:cNvPr>
@@ -6267,13 +6267,20 @@
     </p:spTree>
     <p:extLst>
       <p:ext uri="{BB962C8B-B14F-4D97-AF65-F5344CB8AC3E}">
-        <p14:creationId xmlns:p14="http://schemas.microsoft.com/office/powerpoint/2010/main" val="2195410648"/>
+        <p14:creationId xmlns="" xmlns:p14="http://schemas.microsoft.com/office/powerpoint/2010/main" val="2195410648"/>
       </p:ext>
     </p:extLst>
   </p:cSld>
   <p:clrMapOvr>
     <a:masterClrMapping/>
   </p:clrMapOvr>
+  <p:timing>
+    <p:tnLst>
+      <p:par>
+        <p:cTn id="1" dur="indefinite" restart="never" nodeType="tmRoot"/>
+      </p:par>
+    </p:tnLst>
+  </p:timing>
 </p:sld>
 </file>
 
@@ -6299,7 +6306,7 @@
           <p:cNvPr id="2" name="Title 1">
             <a:extLst>
               <a:ext uri="{FF2B5EF4-FFF2-40B4-BE49-F238E27FC236}">
-                <a16:creationId xmlns:a16="http://schemas.microsoft.com/office/drawing/2014/main" id="{587129A2-8DBF-24C3-E467-F6799A54C100}"/>
+                <a16:creationId xmlns="" xmlns:a16="http://schemas.microsoft.com/office/drawing/2014/main" id="{587129A2-8DBF-24C3-E467-F6799A54C100}"/>
               </a:ext>
             </a:extLst>
           </p:cNvPr>
@@ -6349,7 +6356,7 @@
           <p:cNvPr id="5" name="Picture 5" descr="Chart&#10;&#10;Description automatically generated">
             <a:extLst>
               <a:ext uri="{FF2B5EF4-FFF2-40B4-BE49-F238E27FC236}">
-                <a16:creationId xmlns:a16="http://schemas.microsoft.com/office/drawing/2014/main" id="{7A6A7BC2-FC4A-0367-5D56-A781F8F2D86D}"/>
+                <a16:creationId xmlns="" xmlns:a16="http://schemas.microsoft.com/office/drawing/2014/main" id="{7A6A7BC2-FC4A-0367-5D56-A781F8F2D86D}"/>
               </a:ext>
             </a:extLst>
           </p:cNvPr>
@@ -6379,7 +6386,7 @@
           <p:cNvPr id="6" name="Picture 6" descr="Chart, line chart&#10;&#10;Description automatically generated">
             <a:extLst>
               <a:ext uri="{FF2B5EF4-FFF2-40B4-BE49-F238E27FC236}">
-                <a16:creationId xmlns:a16="http://schemas.microsoft.com/office/drawing/2014/main" id="{D0D16302-D286-29DA-21C8-E134834CB7FD}"/>
+                <a16:creationId xmlns="" xmlns:a16="http://schemas.microsoft.com/office/drawing/2014/main" id="{D0D16302-D286-29DA-21C8-E134834CB7FD}"/>
               </a:ext>
             </a:extLst>
           </p:cNvPr>
@@ -6409,7 +6416,7 @@
           <p:cNvPr id="7" name="Picture 7" descr="Chart, line chart&#10;&#10;Description automatically generated">
             <a:extLst>
               <a:ext uri="{FF2B5EF4-FFF2-40B4-BE49-F238E27FC236}">
-                <a16:creationId xmlns:a16="http://schemas.microsoft.com/office/drawing/2014/main" id="{F0928F49-7F08-BAA0-0106-F5C80E0391C6}"/>
+                <a16:creationId xmlns="" xmlns:a16="http://schemas.microsoft.com/office/drawing/2014/main" id="{F0928F49-7F08-BAA0-0106-F5C80E0391C6}"/>
               </a:ext>
             </a:extLst>
           </p:cNvPr>
@@ -6437,13 +6444,20 @@
     </p:spTree>
     <p:extLst>
       <p:ext uri="{BB962C8B-B14F-4D97-AF65-F5344CB8AC3E}">
-        <p14:creationId xmlns:p14="http://schemas.microsoft.com/office/powerpoint/2010/main" val="1295673791"/>
+        <p14:creationId xmlns="" xmlns:p14="http://schemas.microsoft.com/office/powerpoint/2010/main" val="1295673791"/>
       </p:ext>
     </p:extLst>
   </p:cSld>
   <p:clrMapOvr>
     <a:masterClrMapping/>
   </p:clrMapOvr>
+  <p:timing>
+    <p:tnLst>
+      <p:par>
+        <p:cTn id="1" dur="indefinite" restart="never" nodeType="tmRoot"/>
+      </p:par>
+    </p:tnLst>
+  </p:timing>
 </p:sld>
 </file>
 
@@ -6469,7 +6483,7 @@
           <p:cNvPr id="2" name="Title 1">
             <a:extLst>
               <a:ext uri="{FF2B5EF4-FFF2-40B4-BE49-F238E27FC236}">
-                <a16:creationId xmlns:a16="http://schemas.microsoft.com/office/drawing/2014/main" id="{587129A2-8DBF-24C3-E467-F6799A54C100}"/>
+                <a16:creationId xmlns="" xmlns:a16="http://schemas.microsoft.com/office/drawing/2014/main" id="{587129A2-8DBF-24C3-E467-F6799A54C100}"/>
               </a:ext>
             </a:extLst>
           </p:cNvPr>
@@ -6519,7 +6533,7 @@
           <p:cNvPr id="5" name="Picture 5" descr="Chart&#10;&#10;Description automatically generated">
             <a:extLst>
               <a:ext uri="{FF2B5EF4-FFF2-40B4-BE49-F238E27FC236}">
-                <a16:creationId xmlns:a16="http://schemas.microsoft.com/office/drawing/2014/main" id="{7A6A7BC2-FC4A-0367-5D56-A781F8F2D86D}"/>
+                <a16:creationId xmlns="" xmlns:a16="http://schemas.microsoft.com/office/drawing/2014/main" id="{7A6A7BC2-FC4A-0367-5D56-A781F8F2D86D}"/>
               </a:ext>
             </a:extLst>
           </p:cNvPr>
@@ -6549,7 +6563,7 @@
           <p:cNvPr id="6" name="Picture 6" descr="Chart, line chart&#10;&#10;Description automatically generated">
             <a:extLst>
               <a:ext uri="{FF2B5EF4-FFF2-40B4-BE49-F238E27FC236}">
-                <a16:creationId xmlns:a16="http://schemas.microsoft.com/office/drawing/2014/main" id="{D0D16302-D286-29DA-21C8-E134834CB7FD}"/>
+                <a16:creationId xmlns="" xmlns:a16="http://schemas.microsoft.com/office/drawing/2014/main" id="{D0D16302-D286-29DA-21C8-E134834CB7FD}"/>
               </a:ext>
             </a:extLst>
           </p:cNvPr>
@@ -6579,7 +6593,7 @@
           <p:cNvPr id="7" name="Picture 7" descr="Chart, line chart&#10;&#10;Description automatically generated">
             <a:extLst>
               <a:ext uri="{FF2B5EF4-FFF2-40B4-BE49-F238E27FC236}">
-                <a16:creationId xmlns:a16="http://schemas.microsoft.com/office/drawing/2014/main" id="{F0928F49-7F08-BAA0-0106-F5C80E0391C6}"/>
+                <a16:creationId xmlns="" xmlns:a16="http://schemas.microsoft.com/office/drawing/2014/main" id="{F0928F49-7F08-BAA0-0106-F5C80E0391C6}"/>
               </a:ext>
             </a:extLst>
           </p:cNvPr>
@@ -6607,13 +6621,20 @@
     </p:spTree>
     <p:extLst>
       <p:ext uri="{BB962C8B-B14F-4D97-AF65-F5344CB8AC3E}">
-        <p14:creationId xmlns:p14="http://schemas.microsoft.com/office/powerpoint/2010/main" val="1874542703"/>
+        <p14:creationId xmlns="" xmlns:p14="http://schemas.microsoft.com/office/powerpoint/2010/main" val="1874542703"/>
       </p:ext>
     </p:extLst>
   </p:cSld>
   <p:clrMapOvr>
     <a:masterClrMapping/>
   </p:clrMapOvr>
+  <p:timing>
+    <p:tnLst>
+      <p:par>
+        <p:cTn id="1" dur="indefinite" restart="never" nodeType="tmRoot"/>
+      </p:par>
+    </p:tnLst>
+  </p:timing>
 </p:sld>
 </file>
 
@@ -6639,7 +6660,7 @@
           <p:cNvPr id="2" name="Title 1">
             <a:extLst>
               <a:ext uri="{FF2B5EF4-FFF2-40B4-BE49-F238E27FC236}">
-                <a16:creationId xmlns:a16="http://schemas.microsoft.com/office/drawing/2014/main" id="{587129A2-8DBF-24C3-E467-F6799A54C100}"/>
+                <a16:creationId xmlns="" xmlns:a16="http://schemas.microsoft.com/office/drawing/2014/main" id="{587129A2-8DBF-24C3-E467-F6799A54C100}"/>
               </a:ext>
             </a:extLst>
           </p:cNvPr>
@@ -6689,7 +6710,7 @@
           <p:cNvPr id="3" name="Picture 3" descr="Chart, bar chart&#10;&#10;Description automatically generated">
             <a:extLst>
               <a:ext uri="{FF2B5EF4-FFF2-40B4-BE49-F238E27FC236}">
-                <a16:creationId xmlns:a16="http://schemas.microsoft.com/office/drawing/2014/main" id="{768B141C-DCEE-8411-742C-094C86F4CF2D}"/>
+                <a16:creationId xmlns="" xmlns:a16="http://schemas.microsoft.com/office/drawing/2014/main" id="{768B141C-DCEE-8411-742C-094C86F4CF2D}"/>
               </a:ext>
             </a:extLst>
           </p:cNvPr>
@@ -6706,8 +6727,8 @@
         </p:blipFill>
         <p:spPr>
           <a:xfrm>
-            <a:off x="1968030" y="1187539"/>
-            <a:ext cx="4126088" cy="2300404"/>
+            <a:off x="2416486" y="1187539"/>
+            <a:ext cx="3229176" cy="2300404"/>
           </a:xfrm>
           <a:prstGeom prst="rect">
             <a:avLst/>
@@ -6719,7 +6740,7 @@
           <p:cNvPr id="4" name="Picture 7" descr="Chart, bar chart&#10;&#10;Description automatically generated">
             <a:extLst>
               <a:ext uri="{FF2B5EF4-FFF2-40B4-BE49-F238E27FC236}">
-                <a16:creationId xmlns:a16="http://schemas.microsoft.com/office/drawing/2014/main" id="{59CB979A-09FE-2FF1-7B7B-9904C0C744FF}"/>
+                <a16:creationId xmlns="" xmlns:a16="http://schemas.microsoft.com/office/drawing/2014/main" id="{59CB979A-09FE-2FF1-7B7B-9904C0C744FF}"/>
               </a:ext>
             </a:extLst>
           </p:cNvPr>
@@ -6736,8 +6757,8 @@
         </p:blipFill>
         <p:spPr>
           <a:xfrm>
-            <a:off x="7142104" y="1188696"/>
-            <a:ext cx="4126088" cy="2298088"/>
+            <a:off x="7564534" y="1188696"/>
+            <a:ext cx="3281227" cy="2298088"/>
           </a:xfrm>
           <a:prstGeom prst="rect">
             <a:avLst/>
@@ -6749,7 +6770,7 @@
           <p:cNvPr id="8" name="Picture 8" descr="Chart, bar chart&#10;&#10;Description automatically generated">
             <a:extLst>
               <a:ext uri="{FF2B5EF4-FFF2-40B4-BE49-F238E27FC236}">
-                <a16:creationId xmlns:a16="http://schemas.microsoft.com/office/drawing/2014/main" id="{B3AD4A45-05BD-1F7B-CA55-6F1416CAEE9F}"/>
+                <a16:creationId xmlns="" xmlns:a16="http://schemas.microsoft.com/office/drawing/2014/main" id="{B3AD4A45-05BD-1F7B-CA55-6F1416CAEE9F}"/>
               </a:ext>
             </a:extLst>
           </p:cNvPr>
@@ -6766,8 +6787,8 @@
         </p:blipFill>
         <p:spPr>
           <a:xfrm>
-            <a:off x="1968030" y="3934502"/>
-            <a:ext cx="4126088" cy="2300403"/>
+            <a:off x="2416486" y="3934502"/>
+            <a:ext cx="3229175" cy="2300403"/>
           </a:xfrm>
           <a:prstGeom prst="rect">
             <a:avLst/>
@@ -6779,7 +6800,7 @@
           <p:cNvPr id="9" name="Picture 9" descr="Chart, bar chart&#10;&#10;Description automatically generated">
             <a:extLst>
               <a:ext uri="{FF2B5EF4-FFF2-40B4-BE49-F238E27FC236}">
-                <a16:creationId xmlns:a16="http://schemas.microsoft.com/office/drawing/2014/main" id="{8BD21886-E981-F9E6-99E9-0CF0E7FBEEE5}"/>
+                <a16:creationId xmlns="" xmlns:a16="http://schemas.microsoft.com/office/drawing/2014/main" id="{8BD21886-E981-F9E6-99E9-0CF0E7FBEEE5}"/>
               </a:ext>
             </a:extLst>
           </p:cNvPr>
@@ -6796,8 +6817,8 @@
         </p:blipFill>
         <p:spPr>
           <a:xfrm>
-            <a:off x="7142104" y="3934502"/>
-            <a:ext cx="4126088" cy="2300404"/>
+            <a:off x="7658219" y="3934502"/>
+            <a:ext cx="3093858" cy="2300404"/>
           </a:xfrm>
           <a:prstGeom prst="rect">
             <a:avLst/>
@@ -6807,13 +6828,20 @@
     </p:spTree>
     <p:extLst>
       <p:ext uri="{BB962C8B-B14F-4D97-AF65-F5344CB8AC3E}">
-        <p14:creationId xmlns:p14="http://schemas.microsoft.com/office/powerpoint/2010/main" val="367225045"/>
+        <p14:creationId xmlns="" xmlns:p14="http://schemas.microsoft.com/office/powerpoint/2010/main" val="367225045"/>
       </p:ext>
     </p:extLst>
   </p:cSld>
   <p:clrMapOvr>
     <a:masterClrMapping/>
   </p:clrMapOvr>
+  <p:timing>
+    <p:tnLst>
+      <p:par>
+        <p:cTn id="1" dur="indefinite" restart="never" nodeType="tmRoot"/>
+      </p:par>
+    </p:tnLst>
+  </p:timing>
 </p:sld>
 </file>
 
@@ -6839,7 +6867,7 @@
           <p:cNvPr id="2" name="Title 1">
             <a:extLst>
               <a:ext uri="{FF2B5EF4-FFF2-40B4-BE49-F238E27FC236}">
-                <a16:creationId xmlns:a16="http://schemas.microsoft.com/office/drawing/2014/main" id="{587129A2-8DBF-24C3-E467-F6799A54C100}"/>
+                <a16:creationId xmlns="" xmlns:a16="http://schemas.microsoft.com/office/drawing/2014/main" id="{587129A2-8DBF-24C3-E467-F6799A54C100}"/>
               </a:ext>
             </a:extLst>
           </p:cNvPr>
@@ -6889,7 +6917,7 @@
           <p:cNvPr id="3" name="Picture 3" descr="Chart, pie chart&#10;&#10;Description automatically generated">
             <a:extLst>
               <a:ext uri="{FF2B5EF4-FFF2-40B4-BE49-F238E27FC236}">
-                <a16:creationId xmlns:a16="http://schemas.microsoft.com/office/drawing/2014/main" id="{2E9DCB28-D4D1-8A3A-8F43-621C5E34B176}"/>
+                <a16:creationId xmlns="" xmlns:a16="http://schemas.microsoft.com/office/drawing/2014/main" id="{2E9DCB28-D4D1-8A3A-8F43-621C5E34B176}"/>
               </a:ext>
             </a:extLst>
           </p:cNvPr>
@@ -6906,8 +6934,8 @@
         </p:blipFill>
         <p:spPr>
           <a:xfrm>
-            <a:off x="1986844" y="3471333"/>
-            <a:ext cx="10015124" cy="2906888"/>
+            <a:off x="2964023" y="3471333"/>
+            <a:ext cx="8060765" cy="2906888"/>
           </a:xfrm>
           <a:prstGeom prst="rect">
             <a:avLst/>
@@ -6919,7 +6947,7 @@
           <p:cNvPr id="5" name="Picture 5" descr="Chart, scatter chart&#10;&#10;Description automatically generated">
             <a:extLst>
               <a:ext uri="{FF2B5EF4-FFF2-40B4-BE49-F238E27FC236}">
-                <a16:creationId xmlns:a16="http://schemas.microsoft.com/office/drawing/2014/main" id="{14AC9DBC-9A69-61E3-7596-E057B92321B2}"/>
+                <a16:creationId xmlns="" xmlns:a16="http://schemas.microsoft.com/office/drawing/2014/main" id="{14AC9DBC-9A69-61E3-7596-E057B92321B2}"/>
               </a:ext>
             </a:extLst>
           </p:cNvPr>
@@ -6936,8 +6964,8 @@
         </p:blipFill>
         <p:spPr>
           <a:xfrm>
-            <a:off x="1986844" y="847225"/>
-            <a:ext cx="2432756" cy="2623550"/>
+            <a:off x="2964023" y="847226"/>
+            <a:ext cx="2695372" cy="2624107"/>
           </a:xfrm>
           <a:prstGeom prst="rect">
             <a:avLst/>
@@ -6949,7 +6977,7 @@
           <p:cNvPr id="6" name="Picture 6" descr="Chart, scatter chart&#10;&#10;Description automatically generated">
             <a:extLst>
               <a:ext uri="{FF2B5EF4-FFF2-40B4-BE49-F238E27FC236}">
-                <a16:creationId xmlns:a16="http://schemas.microsoft.com/office/drawing/2014/main" id="{749A7983-E7C6-9D8E-3B0C-833B7F1B2B57}"/>
+                <a16:creationId xmlns="" xmlns:a16="http://schemas.microsoft.com/office/drawing/2014/main" id="{749A7983-E7C6-9D8E-3B0C-833B7F1B2B57}"/>
               </a:ext>
             </a:extLst>
           </p:cNvPr>
@@ -6966,8 +6994,8 @@
         </p:blipFill>
         <p:spPr>
           <a:xfrm>
-            <a:off x="4423363" y="846219"/>
-            <a:ext cx="2460978" cy="2672600"/>
+            <a:off x="5659395" y="847226"/>
+            <a:ext cx="2598547" cy="2624107"/>
           </a:xfrm>
           <a:prstGeom prst="rect">
             <a:avLst/>
@@ -6979,7 +7007,7 @@
           <p:cNvPr id="7" name="Picture 7" descr="Chart, scatter chart&#10;&#10;Description automatically generated">
             <a:extLst>
               <a:ext uri="{FF2B5EF4-FFF2-40B4-BE49-F238E27FC236}">
-                <a16:creationId xmlns:a16="http://schemas.microsoft.com/office/drawing/2014/main" id="{BBC2C5B0-D310-B953-8A2C-A39398A738F5}"/>
+                <a16:creationId xmlns="" xmlns:a16="http://schemas.microsoft.com/office/drawing/2014/main" id="{BBC2C5B0-D310-B953-8A2C-A39398A738F5}"/>
               </a:ext>
             </a:extLst>
           </p:cNvPr>
@@ -6996,38 +7024,8 @@
         </p:blipFill>
         <p:spPr>
           <a:xfrm>
-            <a:off x="6888104" y="846219"/>
-            <a:ext cx="2602089" cy="2625563"/>
-          </a:xfrm>
-          <a:prstGeom prst="rect">
-            <a:avLst/>
-          </a:prstGeom>
-        </p:spPr>
-      </p:pic>
-      <p:pic>
-        <p:nvPicPr>
-          <p:cNvPr id="8" name="Picture 8" descr="Chart, scatter chart&#10;&#10;Description automatically generated">
-            <a:extLst>
-              <a:ext uri="{FF2B5EF4-FFF2-40B4-BE49-F238E27FC236}">
-                <a16:creationId xmlns:a16="http://schemas.microsoft.com/office/drawing/2014/main" id="{A9770382-B699-3D3D-4164-9FA58C612CBB}"/>
-              </a:ext>
-            </a:extLst>
-          </p:cNvPr>
-          <p:cNvPicPr>
-            <a:picLocks noChangeAspect="1"/>
-          </p:cNvPicPr>
-          <p:nvPr/>
-        </p:nvPicPr>
-        <p:blipFill>
-          <a:blip r:embed="rId6"/>
-          <a:stretch>
-            <a:fillRect/>
-          </a:stretch>
-        </p:blipFill>
-        <p:spPr>
-          <a:xfrm>
-            <a:off x="9493956" y="846219"/>
-            <a:ext cx="2508015" cy="2625563"/>
+            <a:off x="8257943" y="847226"/>
+            <a:ext cx="2766846" cy="2623550"/>
           </a:xfrm>
           <a:prstGeom prst="rect">
             <a:avLst/>
@@ -7037,13 +7035,20 @@
     </p:spTree>
     <p:extLst>
       <p:ext uri="{BB962C8B-B14F-4D97-AF65-F5344CB8AC3E}">
-        <p14:creationId xmlns:p14="http://schemas.microsoft.com/office/powerpoint/2010/main" val="2682036094"/>
+        <p14:creationId xmlns="" xmlns:p14="http://schemas.microsoft.com/office/powerpoint/2010/main" val="2682036094"/>
       </p:ext>
     </p:extLst>
   </p:cSld>
   <p:clrMapOvr>
     <a:masterClrMapping/>
   </p:clrMapOvr>
+  <p:timing>
+    <p:tnLst>
+      <p:par>
+        <p:cTn id="1" dur="indefinite" restart="never" nodeType="tmRoot"/>
+      </p:par>
+    </p:tnLst>
+  </p:timing>
 </p:sld>
 </file>
 
@@ -7069,7 +7074,7 @@
           <p:cNvPr id="2" name="Title 1">
             <a:extLst>
               <a:ext uri="{FF2B5EF4-FFF2-40B4-BE49-F238E27FC236}">
-                <a16:creationId xmlns:a16="http://schemas.microsoft.com/office/drawing/2014/main" id="{587129A2-8DBF-24C3-E467-F6799A54C100}"/>
+                <a16:creationId xmlns="" xmlns:a16="http://schemas.microsoft.com/office/drawing/2014/main" id="{587129A2-8DBF-24C3-E467-F6799A54C100}"/>
               </a:ext>
             </a:extLst>
           </p:cNvPr>
@@ -7133,7 +7138,7 @@
           <p:cNvPr id="4" name="Picture 8" descr="Table&#10;&#10;Description automatically generated">
             <a:extLst>
               <a:ext uri="{FF2B5EF4-FFF2-40B4-BE49-F238E27FC236}">
-                <a16:creationId xmlns:a16="http://schemas.microsoft.com/office/drawing/2014/main" id="{8DB2BC19-28B5-81F5-C39E-C67CCC138180}"/>
+                <a16:creationId xmlns="" xmlns:a16="http://schemas.microsoft.com/office/drawing/2014/main" id="{8DB2BC19-28B5-81F5-C39E-C67CCC138180}"/>
               </a:ext>
             </a:extLst>
           </p:cNvPr>
@@ -7163,7 +7168,7 @@
           <p:cNvPr id="9" name="Picture 9" descr="Chart, diagram&#10;&#10;Description automatically generated">
             <a:extLst>
               <a:ext uri="{FF2B5EF4-FFF2-40B4-BE49-F238E27FC236}">
-                <a16:creationId xmlns:a16="http://schemas.microsoft.com/office/drawing/2014/main" id="{1605832D-01BA-7CDA-0B9B-982E5E53E6DD}"/>
+                <a16:creationId xmlns="" xmlns:a16="http://schemas.microsoft.com/office/drawing/2014/main" id="{1605832D-01BA-7CDA-0B9B-982E5E53E6DD}"/>
               </a:ext>
             </a:extLst>
           </p:cNvPr>
@@ -7191,13 +7196,20 @@
     </p:spTree>
     <p:extLst>
       <p:ext uri="{BB962C8B-B14F-4D97-AF65-F5344CB8AC3E}">
-        <p14:creationId xmlns:p14="http://schemas.microsoft.com/office/powerpoint/2010/main" val="3099283151"/>
+        <p14:creationId xmlns="" xmlns:p14="http://schemas.microsoft.com/office/powerpoint/2010/main" val="3099283151"/>
       </p:ext>
     </p:extLst>
   </p:cSld>
   <p:clrMapOvr>
     <a:masterClrMapping/>
   </p:clrMapOvr>
+  <p:timing>
+    <p:tnLst>
+      <p:par>
+        <p:cTn id="1" dur="indefinite" restart="never" nodeType="tmRoot"/>
+      </p:par>
+    </p:tnLst>
+  </p:timing>
 </p:sld>
 </file>
 
@@ -7244,10 +7256,10 @@
           <p:cNvPr id="8" name="Group 7">
             <a:extLst>
               <a:ext uri="{FF2B5EF4-FFF2-40B4-BE49-F238E27FC236}">
-                <a16:creationId xmlns:a16="http://schemas.microsoft.com/office/drawing/2014/main" id="{E9D059B6-ADD8-488A-B346-63289E90D13F}"/>
+                <a16:creationId xmlns="" xmlns:a16="http://schemas.microsoft.com/office/drawing/2014/main" id="{E9D059B6-ADD8-488A-B346-63289E90D13F}"/>
               </a:ext>
               <a:ext uri="{C183D7F6-B498-43B3-948B-1728B52AA6E4}">
-                <adec:decorative xmlns:adec="http://schemas.microsoft.com/office/drawing/2017/decorative" val="1"/>
+                <adec:decorative xmlns="" xmlns:adec="http://schemas.microsoft.com/office/drawing/2017/decorative" val="1"/>
               </a:ext>
             </a:extLst>
           </p:cNvPr>
@@ -7257,7 +7269,7 @@
           <p:nvPr>
             <p:extLst>
               <p:ext uri="{386F3935-93C4-4BCD-93E2-E3B085C9AB24}">
-                <p16:designElem xmlns:p16="http://schemas.microsoft.com/office/powerpoint/2015/main" val="1"/>
+                <p16:designElem xmlns="" xmlns:p16="http://schemas.microsoft.com/office/powerpoint/2015/main" val="1"/>
               </p:ext>
             </p:extLst>
           </p:nvPr>
@@ -7275,10 +7287,10 @@
             <p:cNvPr id="9" name="Freeform 6">
               <a:extLst>
                 <a:ext uri="{FF2B5EF4-FFF2-40B4-BE49-F238E27FC236}">
-                  <a16:creationId xmlns:a16="http://schemas.microsoft.com/office/drawing/2014/main" id="{F69B42B4-BC82-4495-A6F9-A28167B56A0E}"/>
+                  <a16:creationId xmlns="" xmlns:a16="http://schemas.microsoft.com/office/drawing/2014/main" id="{F69B42B4-BC82-4495-A6F9-A28167B56A0E}"/>
                 </a:ext>
                 <a:ext uri="{C183D7F6-B498-43B3-948B-1728B52AA6E4}">
-                  <adec:decorative xmlns:adec="http://schemas.microsoft.com/office/drawing/2017/decorative" val="1"/>
+                  <adec:decorative xmlns="" xmlns:adec="http://schemas.microsoft.com/office/drawing/2017/decorative" val="1"/>
                 </a:ext>
               </a:extLst>
             </p:cNvPr>
@@ -7286,7 +7298,7 @@
             <p:nvPr>
               <p:extLst>
                 <p:ext uri="{386F3935-93C4-4BCD-93E2-E3B085C9AB24}">
-                  <p16:designElem xmlns:p16="http://schemas.microsoft.com/office/powerpoint/2015/main" val="1"/>
+                  <p16:designElem xmlns="" xmlns:p16="http://schemas.microsoft.com/office/powerpoint/2015/main" val="1"/>
                 </p:ext>
               </p:extLst>
             </p:nvPr>
@@ -7336,10 +7348,10 @@
             <p:cNvPr id="10" name="Freeform 7">
               <a:extLst>
                 <a:ext uri="{FF2B5EF4-FFF2-40B4-BE49-F238E27FC236}">
-                  <a16:creationId xmlns:a16="http://schemas.microsoft.com/office/drawing/2014/main" id="{83CC168C-2AD4-4FFB-9F25-420ED6514C7D}"/>
+                  <a16:creationId xmlns="" xmlns:a16="http://schemas.microsoft.com/office/drawing/2014/main" id="{83CC168C-2AD4-4FFB-9F25-420ED6514C7D}"/>
                 </a:ext>
                 <a:ext uri="{C183D7F6-B498-43B3-948B-1728B52AA6E4}">
-                  <adec:decorative xmlns:adec="http://schemas.microsoft.com/office/drawing/2017/decorative" val="1"/>
+                  <adec:decorative xmlns="" xmlns:adec="http://schemas.microsoft.com/office/drawing/2017/decorative" val="1"/>
                 </a:ext>
               </a:extLst>
             </p:cNvPr>
@@ -7347,7 +7359,7 @@
             <p:nvPr>
               <p:extLst>
                 <p:ext uri="{386F3935-93C4-4BCD-93E2-E3B085C9AB24}">
-                  <p16:designElem xmlns:p16="http://schemas.microsoft.com/office/powerpoint/2015/main" val="1"/>
+                  <p16:designElem xmlns="" xmlns:p16="http://schemas.microsoft.com/office/powerpoint/2015/main" val="1"/>
                 </p:ext>
               </p:extLst>
             </p:nvPr>
@@ -7403,10 +7415,10 @@
             <p:cNvPr id="11" name="Freeform 9">
               <a:extLst>
                 <a:ext uri="{FF2B5EF4-FFF2-40B4-BE49-F238E27FC236}">
-                  <a16:creationId xmlns:a16="http://schemas.microsoft.com/office/drawing/2014/main" id="{6C9F369A-6158-4AE8-BA04-138A9DFFAE05}"/>
+                  <a16:creationId xmlns="" xmlns:a16="http://schemas.microsoft.com/office/drawing/2014/main" id="{6C9F369A-6158-4AE8-BA04-138A9DFFAE05}"/>
                 </a:ext>
                 <a:ext uri="{C183D7F6-B498-43B3-948B-1728B52AA6E4}">
-                  <adec:decorative xmlns:adec="http://schemas.microsoft.com/office/drawing/2017/decorative" val="1"/>
+                  <adec:decorative xmlns="" xmlns:adec="http://schemas.microsoft.com/office/drawing/2017/decorative" val="1"/>
                 </a:ext>
               </a:extLst>
             </p:cNvPr>
@@ -7414,7 +7426,7 @@
             <p:nvPr>
               <p:extLst>
                 <p:ext uri="{386F3935-93C4-4BCD-93E2-E3B085C9AB24}">
-                  <p16:designElem xmlns:p16="http://schemas.microsoft.com/office/powerpoint/2015/main" val="1"/>
+                  <p16:designElem xmlns="" xmlns:p16="http://schemas.microsoft.com/office/powerpoint/2015/main" val="1"/>
                 </p:ext>
               </p:extLst>
             </p:nvPr>
@@ -7464,10 +7476,10 @@
             <p:cNvPr id="12" name="Freeform 10">
               <a:extLst>
                 <a:ext uri="{FF2B5EF4-FFF2-40B4-BE49-F238E27FC236}">
-                  <a16:creationId xmlns:a16="http://schemas.microsoft.com/office/drawing/2014/main" id="{FC7B1DF4-AD98-42A8-820F-667A3DCC40AC}"/>
+                  <a16:creationId xmlns="" xmlns:a16="http://schemas.microsoft.com/office/drawing/2014/main" id="{FC7B1DF4-AD98-42A8-820F-667A3DCC40AC}"/>
                 </a:ext>
                 <a:ext uri="{C183D7F6-B498-43B3-948B-1728B52AA6E4}">
-                  <adec:decorative xmlns:adec="http://schemas.microsoft.com/office/drawing/2017/decorative" val="1"/>
+                  <adec:decorative xmlns="" xmlns:adec="http://schemas.microsoft.com/office/drawing/2017/decorative" val="1"/>
                 </a:ext>
               </a:extLst>
             </p:cNvPr>
@@ -7475,7 +7487,7 @@
             <p:nvPr>
               <p:extLst>
                 <p:ext uri="{386F3935-93C4-4BCD-93E2-E3B085C9AB24}">
-                  <p16:designElem xmlns:p16="http://schemas.microsoft.com/office/powerpoint/2015/main" val="1"/>
+                  <p16:designElem xmlns="" xmlns:p16="http://schemas.microsoft.com/office/powerpoint/2015/main" val="1"/>
                 </p:ext>
               </p:extLst>
             </p:nvPr>
@@ -7524,10 +7536,10 @@
             <p:cNvPr id="13" name="Freeform 11">
               <a:extLst>
                 <a:ext uri="{FF2B5EF4-FFF2-40B4-BE49-F238E27FC236}">
-                  <a16:creationId xmlns:a16="http://schemas.microsoft.com/office/drawing/2014/main" id="{61C58B74-3656-4FD5-AC47-EE3A59EBB818}"/>
+                  <a16:creationId xmlns="" xmlns:a16="http://schemas.microsoft.com/office/drawing/2014/main" id="{61C58B74-3656-4FD5-AC47-EE3A59EBB818}"/>
                 </a:ext>
                 <a:ext uri="{C183D7F6-B498-43B3-948B-1728B52AA6E4}">
-                  <adec:decorative xmlns:adec="http://schemas.microsoft.com/office/drawing/2017/decorative" val="1"/>
+                  <adec:decorative xmlns="" xmlns:adec="http://schemas.microsoft.com/office/drawing/2017/decorative" val="1"/>
                 </a:ext>
               </a:extLst>
             </p:cNvPr>
@@ -7535,7 +7547,7 @@
             <p:nvPr>
               <p:extLst>
                 <p:ext uri="{386F3935-93C4-4BCD-93E2-E3B085C9AB24}">
-                  <p16:designElem xmlns:p16="http://schemas.microsoft.com/office/powerpoint/2015/main" val="1"/>
+                  <p16:designElem xmlns="" xmlns:p16="http://schemas.microsoft.com/office/powerpoint/2015/main" val="1"/>
                 </p:ext>
               </p:extLst>
             </p:nvPr>
@@ -7590,10 +7602,10 @@
             <p:cNvPr id="14" name="Freeform 12">
               <a:extLst>
                 <a:ext uri="{FF2B5EF4-FFF2-40B4-BE49-F238E27FC236}">
-                  <a16:creationId xmlns:a16="http://schemas.microsoft.com/office/drawing/2014/main" id="{8B349A01-D803-4A18-B608-47BFCED43435}"/>
+                  <a16:creationId xmlns="" xmlns:a16="http://schemas.microsoft.com/office/drawing/2014/main" id="{8B349A01-D803-4A18-B608-47BFCED43435}"/>
                 </a:ext>
                 <a:ext uri="{C183D7F6-B498-43B3-948B-1728B52AA6E4}">
-                  <adec:decorative xmlns:adec="http://schemas.microsoft.com/office/drawing/2017/decorative" val="1"/>
+                  <adec:decorative xmlns="" xmlns:adec="http://schemas.microsoft.com/office/drawing/2017/decorative" val="1"/>
                 </a:ext>
               </a:extLst>
             </p:cNvPr>
@@ -7601,7 +7613,7 @@
             <p:nvPr>
               <p:extLst>
                 <p:ext uri="{386F3935-93C4-4BCD-93E2-E3B085C9AB24}">
-                  <p16:designElem xmlns:p16="http://schemas.microsoft.com/office/powerpoint/2015/main" val="1"/>
+                  <p16:designElem xmlns="" xmlns:p16="http://schemas.microsoft.com/office/powerpoint/2015/main" val="1"/>
                 </p:ext>
               </p:extLst>
             </p:nvPr>
@@ -7664,10 +7676,10 @@
           <p:cNvPr id="16" name="Rectangle 15">
             <a:extLst>
               <a:ext uri="{FF2B5EF4-FFF2-40B4-BE49-F238E27FC236}">
-                <a16:creationId xmlns:a16="http://schemas.microsoft.com/office/drawing/2014/main" id="{15655827-B42D-4180-88D3-D83F25E4BD1C}"/>
+                <a16:creationId xmlns="" xmlns:a16="http://schemas.microsoft.com/office/drawing/2014/main" id="{15655827-B42D-4180-88D3-D83F25E4BD1C}"/>
               </a:ext>
               <a:ext uri="{C183D7F6-B498-43B3-948B-1728B52AA6E4}">
-                <adec:decorative xmlns:adec="http://schemas.microsoft.com/office/drawing/2017/decorative" val="1"/>
+                <adec:decorative xmlns="" xmlns:adec="http://schemas.microsoft.com/office/drawing/2017/decorative" val="1"/>
               </a:ext>
             </a:extLst>
           </p:cNvPr>
@@ -7677,7 +7689,7 @@
           <p:nvPr>
             <p:extLst>
               <p:ext uri="{386F3935-93C4-4BCD-93E2-E3B085C9AB24}">
-                <p16:designElem xmlns:p16="http://schemas.microsoft.com/office/powerpoint/2015/main" val="1"/>
+                <p16:designElem xmlns="" xmlns:p16="http://schemas.microsoft.com/office/powerpoint/2015/main" val="1"/>
               </p:ext>
             </p:extLst>
           </p:nvPr>
@@ -7709,10 +7721,10 @@
           <p:cNvPr id="18" name="Freeform: Shape 17">
             <a:extLst>
               <a:ext uri="{FF2B5EF4-FFF2-40B4-BE49-F238E27FC236}">
-                <a16:creationId xmlns:a16="http://schemas.microsoft.com/office/drawing/2014/main" id="{24ACCB06-563C-4ADE-B4D6-1FE9F723C7D9}"/>
+                <a16:creationId xmlns="" xmlns:a16="http://schemas.microsoft.com/office/drawing/2014/main" id="{24ACCB06-563C-4ADE-B4D6-1FE9F723C7D9}"/>
               </a:ext>
               <a:ext uri="{C183D7F6-B498-43B3-948B-1728B52AA6E4}">
-                <adec:decorative xmlns:adec="http://schemas.microsoft.com/office/drawing/2017/decorative" val="1"/>
+                <adec:decorative xmlns="" xmlns:adec="http://schemas.microsoft.com/office/drawing/2017/decorative" val="1"/>
               </a:ext>
             </a:extLst>
           </p:cNvPr>
@@ -7722,7 +7734,7 @@
           <p:nvPr>
             <p:extLst>
               <p:ext uri="{386F3935-93C4-4BCD-93E2-E3B085C9AB24}">
-                <p16:designElem xmlns:p16="http://schemas.microsoft.com/office/powerpoint/2015/main" val="1"/>
+                <p16:designElem xmlns="" xmlns:p16="http://schemas.microsoft.com/office/powerpoint/2015/main" val="1"/>
               </p:ext>
             </p:extLst>
           </p:nvPr>
@@ -7791,10 +7803,10 @@
           <p:cNvPr id="20" name="Freeform: Shape 19">
             <a:extLst>
               <a:ext uri="{FF2B5EF4-FFF2-40B4-BE49-F238E27FC236}">
-                <a16:creationId xmlns:a16="http://schemas.microsoft.com/office/drawing/2014/main" id="{40761ECD-D92B-46AE-82CA-640023D282F9}"/>
+                <a16:creationId xmlns="" xmlns:a16="http://schemas.microsoft.com/office/drawing/2014/main" id="{40761ECD-D92B-46AE-82CA-640023D282F9}"/>
               </a:ext>
               <a:ext uri="{C183D7F6-B498-43B3-948B-1728B52AA6E4}">
-                <adec:decorative xmlns:adec="http://schemas.microsoft.com/office/drawing/2017/decorative" val="1"/>
+                <adec:decorative xmlns="" xmlns:adec="http://schemas.microsoft.com/office/drawing/2017/decorative" val="1"/>
               </a:ext>
             </a:extLst>
           </p:cNvPr>
@@ -7804,7 +7816,7 @@
           <p:nvPr>
             <p:extLst>
               <p:ext uri="{386F3935-93C4-4BCD-93E2-E3B085C9AB24}">
-                <p16:designElem xmlns:p16="http://schemas.microsoft.com/office/powerpoint/2015/main" val="1"/>
+                <p16:designElem xmlns="" xmlns:p16="http://schemas.microsoft.com/office/powerpoint/2015/main" val="1"/>
               </p:ext>
             </p:extLst>
           </p:nvPr>
@@ -7875,10 +7887,10 @@
           <p:cNvPr id="22" name="Freeform: Shape 21">
             <a:extLst>
               <a:ext uri="{FF2B5EF4-FFF2-40B4-BE49-F238E27FC236}">
-                <a16:creationId xmlns:a16="http://schemas.microsoft.com/office/drawing/2014/main" id="{9A928607-C55C-40FD-B2DF-6CD6A7226A71}"/>
+                <a16:creationId xmlns="" xmlns:a16="http://schemas.microsoft.com/office/drawing/2014/main" id="{9A928607-C55C-40FD-B2DF-6CD6A7226A71}"/>
               </a:ext>
               <a:ext uri="{C183D7F6-B498-43B3-948B-1728B52AA6E4}">
-                <adec:decorative xmlns:adec="http://schemas.microsoft.com/office/drawing/2017/decorative" val="1"/>
+                <adec:decorative xmlns="" xmlns:adec="http://schemas.microsoft.com/office/drawing/2017/decorative" val="1"/>
               </a:ext>
             </a:extLst>
           </p:cNvPr>
@@ -7888,7 +7900,7 @@
           <p:nvPr>
             <p:extLst>
               <p:ext uri="{386F3935-93C4-4BCD-93E2-E3B085C9AB24}">
-                <p16:designElem xmlns:p16="http://schemas.microsoft.com/office/powerpoint/2015/main" val="1"/>
+                <p16:designElem xmlns="" xmlns:p16="http://schemas.microsoft.com/office/powerpoint/2015/main" val="1"/>
               </p:ext>
             </p:extLst>
           </p:nvPr>
@@ -7959,10 +7971,10 @@
           <p:cNvPr id="24" name="Freeform: Shape 23">
             <a:extLst>
               <a:ext uri="{FF2B5EF4-FFF2-40B4-BE49-F238E27FC236}">
-                <a16:creationId xmlns:a16="http://schemas.microsoft.com/office/drawing/2014/main" id="{400A20C1-29A4-43E0-AB15-7931F76F8C2D}"/>
+                <a16:creationId xmlns="" xmlns:a16="http://schemas.microsoft.com/office/drawing/2014/main" id="{400A20C1-29A4-43E0-AB15-7931F76F8C2D}"/>
               </a:ext>
               <a:ext uri="{C183D7F6-B498-43B3-948B-1728B52AA6E4}">
-                <adec:decorative xmlns:adec="http://schemas.microsoft.com/office/drawing/2017/decorative" val="1"/>
+                <adec:decorative xmlns="" xmlns:adec="http://schemas.microsoft.com/office/drawing/2017/decorative" val="1"/>
               </a:ext>
             </a:extLst>
           </p:cNvPr>
@@ -7972,7 +7984,7 @@
           <p:nvPr>
             <p:extLst>
               <p:ext uri="{386F3935-93C4-4BCD-93E2-E3B085C9AB24}">
-                <p16:designElem xmlns:p16="http://schemas.microsoft.com/office/powerpoint/2015/main" val="1"/>
+                <p16:designElem xmlns="" xmlns:p16="http://schemas.microsoft.com/office/powerpoint/2015/main" val="1"/>
               </p:ext>
             </p:extLst>
           </p:nvPr>
@@ -8041,7 +8053,7 @@
           <p:cNvPr id="2" name="Title 1">
             <a:extLst>
               <a:ext uri="{FF2B5EF4-FFF2-40B4-BE49-F238E27FC236}">
-                <a16:creationId xmlns:a16="http://schemas.microsoft.com/office/drawing/2014/main" id="{9535F13E-B9A0-3D11-8AC4-BDAE9AC2BD84}"/>
+                <a16:creationId xmlns="" xmlns:a16="http://schemas.microsoft.com/office/drawing/2014/main" id="{9535F13E-B9A0-3D11-8AC4-BDAE9AC2BD84}"/>
               </a:ext>
             </a:extLst>
           </p:cNvPr>
@@ -8090,13 +8102,20 @@
     </p:spTree>
     <p:extLst>
       <p:ext uri="{BB962C8B-B14F-4D97-AF65-F5344CB8AC3E}">
-        <p14:creationId xmlns:p14="http://schemas.microsoft.com/office/powerpoint/2010/main" val="1181899702"/>
+        <p14:creationId xmlns="" xmlns:p14="http://schemas.microsoft.com/office/powerpoint/2010/main" val="1181899702"/>
       </p:ext>
     </p:extLst>
   </p:cSld>
   <p:clrMapOvr>
     <a:masterClrMapping/>
   </p:clrMapOvr>
+  <p:timing>
+    <p:tnLst>
+      <p:par>
+        <p:cTn id="1" dur="indefinite" restart="never" nodeType="tmRoot"/>
+      </p:par>
+    </p:tnLst>
+  </p:timing>
 </p:sld>
 </file>
 
@@ -8122,7 +8141,7 @@
           <p:cNvPr id="2" name="Title 1">
             <a:extLst>
               <a:ext uri="{FF2B5EF4-FFF2-40B4-BE49-F238E27FC236}">
-                <a16:creationId xmlns:a16="http://schemas.microsoft.com/office/drawing/2014/main" id="{587129A2-8DBF-24C3-E467-F6799A54C100}"/>
+                <a16:creationId xmlns="" xmlns:a16="http://schemas.microsoft.com/office/drawing/2014/main" id="{587129A2-8DBF-24C3-E467-F6799A54C100}"/>
               </a:ext>
             </a:extLst>
           </p:cNvPr>
@@ -8144,7 +8163,7 @@
           <a:lstStyle/>
           <a:p>
             <a:r>
-              <a:rPr lang="en-US" err="1">
+              <a:rPr lang="en-US" dirty="0" err="1">
                 <a:latin typeface="Arial"/>
                 <a:cs typeface="Arial"/>
               </a:rPr>
@@ -8158,7 +8177,7 @@
               <a:t> </a:t>
             </a:r>
             <a:r>
-              <a:rPr lang="en-US" err="1">
+              <a:rPr lang="en-US" dirty="0" err="1">
                 <a:latin typeface="Arial"/>
                 <a:cs typeface="Arial"/>
               </a:rPr>
@@ -8172,13 +8191,13 @@
               <a:t> </a:t>
             </a:r>
             <a:r>
-              <a:rPr lang="en-US" err="1">
+              <a:rPr lang="en-US" dirty="0" err="1">
                 <a:latin typeface="Arial"/>
                 <a:cs typeface="Arial"/>
               </a:rPr>
               <a:t>podacima</a:t>
             </a:r>
-            <a:endParaRPr lang="en-US">
+            <a:endParaRPr lang="en-US" dirty="0">
               <a:latin typeface="Arial"/>
               <a:cs typeface="Arial"/>
             </a:endParaRPr>
@@ -8190,7 +8209,7 @@
           <p:cNvPr id="3" name="Content Placeholder 2">
             <a:extLst>
               <a:ext uri="{FF2B5EF4-FFF2-40B4-BE49-F238E27FC236}">
-                <a16:creationId xmlns:a16="http://schemas.microsoft.com/office/drawing/2014/main" id="{8F12BDF4-E341-41BB-77F2-40FDDE04BD96}"/>
+                <a16:creationId xmlns="" xmlns:a16="http://schemas.microsoft.com/office/drawing/2014/main" id="{8F12BDF4-E341-41BB-77F2-40FDDE04BD96}"/>
               </a:ext>
             </a:extLst>
           </p:cNvPr>
@@ -8758,13 +8777,20 @@
     </p:spTree>
     <p:extLst>
       <p:ext uri="{BB962C8B-B14F-4D97-AF65-F5344CB8AC3E}">
-        <p14:creationId xmlns:p14="http://schemas.microsoft.com/office/powerpoint/2010/main" val="3016052036"/>
+        <p14:creationId xmlns="" xmlns:p14="http://schemas.microsoft.com/office/powerpoint/2010/main" val="3016052036"/>
       </p:ext>
     </p:extLst>
   </p:cSld>
   <p:clrMapOvr>
     <a:masterClrMapping/>
   </p:clrMapOvr>
+  <p:timing>
+    <p:tnLst>
+      <p:par>
+        <p:cTn id="1" dur="indefinite" restart="never" nodeType="tmRoot"/>
+      </p:par>
+    </p:tnLst>
+  </p:timing>
 </p:sld>
 </file>
 
@@ -8790,7 +8816,7 @@
           <p:cNvPr id="2" name="Title 1">
             <a:extLst>
               <a:ext uri="{FF2B5EF4-FFF2-40B4-BE49-F238E27FC236}">
-                <a16:creationId xmlns:a16="http://schemas.microsoft.com/office/drawing/2014/main" id="{587129A2-8DBF-24C3-E467-F6799A54C100}"/>
+                <a16:creationId xmlns="" xmlns:a16="http://schemas.microsoft.com/office/drawing/2014/main" id="{587129A2-8DBF-24C3-E467-F6799A54C100}"/>
               </a:ext>
             </a:extLst>
           </p:cNvPr>
@@ -8840,7 +8866,7 @@
           <p:cNvPr id="3" name="Content Placeholder 2">
             <a:extLst>
               <a:ext uri="{FF2B5EF4-FFF2-40B4-BE49-F238E27FC236}">
-                <a16:creationId xmlns:a16="http://schemas.microsoft.com/office/drawing/2014/main" id="{8F12BDF4-E341-41BB-77F2-40FDDE04BD96}"/>
+                <a16:creationId xmlns="" xmlns:a16="http://schemas.microsoft.com/office/drawing/2014/main" id="{8F12BDF4-E341-41BB-77F2-40FDDE04BD96}"/>
               </a:ext>
             </a:extLst>
           </p:cNvPr>
@@ -8883,7 +8909,7 @@
           <p:cNvPr id="4" name="Picture 4" descr="Diagram, shape&#10;&#10;Description automatically generated">
             <a:extLst>
               <a:ext uri="{FF2B5EF4-FFF2-40B4-BE49-F238E27FC236}">
-                <a16:creationId xmlns:a16="http://schemas.microsoft.com/office/drawing/2014/main" id="{28F5EBF5-A38B-1871-9BEC-B204A2D6B22F}"/>
+                <a16:creationId xmlns="" xmlns:a16="http://schemas.microsoft.com/office/drawing/2014/main" id="{28F5EBF5-A38B-1871-9BEC-B204A2D6B22F}"/>
               </a:ext>
             </a:extLst>
           </p:cNvPr>
@@ -8913,7 +8939,7 @@
           <p:cNvPr id="5" name="Picture 5" descr="Diagram&#10;&#10;Description automatically generated">
             <a:extLst>
               <a:ext uri="{FF2B5EF4-FFF2-40B4-BE49-F238E27FC236}">
-                <a16:creationId xmlns:a16="http://schemas.microsoft.com/office/drawing/2014/main" id="{E207C2E3-BA19-DDBC-8B34-B21717E61B75}"/>
+                <a16:creationId xmlns="" xmlns:a16="http://schemas.microsoft.com/office/drawing/2014/main" id="{E207C2E3-BA19-DDBC-8B34-B21717E61B75}"/>
               </a:ext>
             </a:extLst>
           </p:cNvPr>
@@ -8943,7 +8969,7 @@
           <p:cNvPr id="6" name="Picture 6" descr="A picture containing polygon&#10;&#10;Description automatically generated">
             <a:extLst>
               <a:ext uri="{FF2B5EF4-FFF2-40B4-BE49-F238E27FC236}">
-                <a16:creationId xmlns:a16="http://schemas.microsoft.com/office/drawing/2014/main" id="{FE39C62C-8EC6-B409-AB70-77F4BEDC060A}"/>
+                <a16:creationId xmlns="" xmlns:a16="http://schemas.microsoft.com/office/drawing/2014/main" id="{FE39C62C-8EC6-B409-AB70-77F4BEDC060A}"/>
               </a:ext>
             </a:extLst>
           </p:cNvPr>
@@ -8971,13 +8997,20 @@
     </p:spTree>
     <p:extLst>
       <p:ext uri="{BB962C8B-B14F-4D97-AF65-F5344CB8AC3E}">
-        <p14:creationId xmlns:p14="http://schemas.microsoft.com/office/powerpoint/2010/main" val="96762183"/>
+        <p14:creationId xmlns="" xmlns:p14="http://schemas.microsoft.com/office/powerpoint/2010/main" val="96762183"/>
       </p:ext>
     </p:extLst>
   </p:cSld>
   <p:clrMapOvr>
     <a:masterClrMapping/>
   </p:clrMapOvr>
+  <p:timing>
+    <p:tnLst>
+      <p:par>
+        <p:cTn id="1" dur="indefinite" restart="never" nodeType="tmRoot"/>
+      </p:par>
+    </p:tnLst>
+  </p:timing>
 </p:sld>
 </file>
 
@@ -9024,10 +9057,10 @@
           <p:cNvPr id="11" name="Group 10">
             <a:extLst>
               <a:ext uri="{FF2B5EF4-FFF2-40B4-BE49-F238E27FC236}">
-                <a16:creationId xmlns:a16="http://schemas.microsoft.com/office/drawing/2014/main" id="{28A4A409-9242-444A-AC1F-809866828B50}"/>
+                <a16:creationId xmlns="" xmlns:a16="http://schemas.microsoft.com/office/drawing/2014/main" id="{28A4A409-9242-444A-AC1F-809866828B50}"/>
               </a:ext>
               <a:ext uri="{C183D7F6-B498-43B3-948B-1728B52AA6E4}">
-                <adec:decorative xmlns:adec="http://schemas.microsoft.com/office/drawing/2017/decorative" val="1"/>
+                <adec:decorative xmlns="" xmlns:adec="http://schemas.microsoft.com/office/drawing/2017/decorative" val="1"/>
               </a:ext>
             </a:extLst>
           </p:cNvPr>
@@ -9037,7 +9070,7 @@
           <p:nvPr>
             <p:extLst>
               <p:ext uri="{386F3935-93C4-4BCD-93E2-E3B085C9AB24}">
-                <p16:designElem xmlns:p16="http://schemas.microsoft.com/office/powerpoint/2015/main" val="1"/>
+                <p16:designElem xmlns="" xmlns:p16="http://schemas.microsoft.com/office/powerpoint/2015/main" val="1"/>
               </p:ext>
             </p:extLst>
           </p:nvPr>
@@ -9055,10 +9088,10 @@
             <p:cNvPr id="12" name="Freeform 6">
               <a:extLst>
                 <a:ext uri="{FF2B5EF4-FFF2-40B4-BE49-F238E27FC236}">
-                  <a16:creationId xmlns:a16="http://schemas.microsoft.com/office/drawing/2014/main" id="{ABF65108-5AB6-40BD-BCAF-526D8E309105}"/>
+                  <a16:creationId xmlns="" xmlns:a16="http://schemas.microsoft.com/office/drawing/2014/main" id="{ABF65108-5AB6-40BD-BCAF-526D8E309105}"/>
                 </a:ext>
                 <a:ext uri="{C183D7F6-B498-43B3-948B-1728B52AA6E4}">
-                  <adec:decorative xmlns:adec="http://schemas.microsoft.com/office/drawing/2017/decorative" val="1"/>
+                  <adec:decorative xmlns="" xmlns:adec="http://schemas.microsoft.com/office/drawing/2017/decorative" val="1"/>
                 </a:ext>
               </a:extLst>
             </p:cNvPr>
@@ -9066,7 +9099,7 @@
             <p:nvPr>
               <p:extLst>
                 <p:ext uri="{386F3935-93C4-4BCD-93E2-E3B085C9AB24}">
-                  <p16:designElem xmlns:p16="http://schemas.microsoft.com/office/powerpoint/2015/main" val="1"/>
+                  <p16:designElem xmlns="" xmlns:p16="http://schemas.microsoft.com/office/powerpoint/2015/main" val="1"/>
                 </p:ext>
               </p:extLst>
             </p:nvPr>
@@ -9116,10 +9149,10 @@
             <p:cNvPr id="13" name="Freeform 7">
               <a:extLst>
                 <a:ext uri="{FF2B5EF4-FFF2-40B4-BE49-F238E27FC236}">
-                  <a16:creationId xmlns:a16="http://schemas.microsoft.com/office/drawing/2014/main" id="{C77C904B-BC3A-472F-BB70-8750D41E41DE}"/>
+                  <a16:creationId xmlns="" xmlns:a16="http://schemas.microsoft.com/office/drawing/2014/main" id="{C77C904B-BC3A-472F-BB70-8750D41E41DE}"/>
                 </a:ext>
                 <a:ext uri="{C183D7F6-B498-43B3-948B-1728B52AA6E4}">
-                  <adec:decorative xmlns:adec="http://schemas.microsoft.com/office/drawing/2017/decorative" val="1"/>
+                  <adec:decorative xmlns="" xmlns:adec="http://schemas.microsoft.com/office/drawing/2017/decorative" val="1"/>
                 </a:ext>
               </a:extLst>
             </p:cNvPr>
@@ -9127,7 +9160,7 @@
             <p:nvPr>
               <p:extLst>
                 <p:ext uri="{386F3935-93C4-4BCD-93E2-E3B085C9AB24}">
-                  <p16:designElem xmlns:p16="http://schemas.microsoft.com/office/powerpoint/2015/main" val="1"/>
+                  <p16:designElem xmlns="" xmlns:p16="http://schemas.microsoft.com/office/powerpoint/2015/main" val="1"/>
                 </p:ext>
               </p:extLst>
             </p:nvPr>
@@ -9180,10 +9213,10 @@
             <p:cNvPr id="14" name="Freeform 8">
               <a:extLst>
                 <a:ext uri="{FF2B5EF4-FFF2-40B4-BE49-F238E27FC236}">
-                  <a16:creationId xmlns:a16="http://schemas.microsoft.com/office/drawing/2014/main" id="{E910D569-2CFD-4010-B886-2F31BB8EC9C7}"/>
+                  <a16:creationId xmlns="" xmlns:a16="http://schemas.microsoft.com/office/drawing/2014/main" id="{E910D569-2CFD-4010-B886-2F31BB8EC9C7}"/>
                 </a:ext>
                 <a:ext uri="{C183D7F6-B498-43B3-948B-1728B52AA6E4}">
-                  <adec:decorative xmlns:adec="http://schemas.microsoft.com/office/drawing/2017/decorative" val="1"/>
+                  <adec:decorative xmlns="" xmlns:adec="http://schemas.microsoft.com/office/drawing/2017/decorative" val="1"/>
                 </a:ext>
               </a:extLst>
             </p:cNvPr>
@@ -9191,7 +9224,7 @@
             <p:nvPr>
               <p:extLst>
                 <p:ext uri="{386F3935-93C4-4BCD-93E2-E3B085C9AB24}">
-                  <p16:designElem xmlns:p16="http://schemas.microsoft.com/office/powerpoint/2015/main" val="1"/>
+                  <p16:designElem xmlns="" xmlns:p16="http://schemas.microsoft.com/office/powerpoint/2015/main" val="1"/>
                 </p:ext>
               </p:extLst>
             </p:nvPr>
@@ -9241,10 +9274,10 @@
             <p:cNvPr id="15" name="Freeform 9">
               <a:extLst>
                 <a:ext uri="{FF2B5EF4-FFF2-40B4-BE49-F238E27FC236}">
-                  <a16:creationId xmlns:a16="http://schemas.microsoft.com/office/drawing/2014/main" id="{5A816932-FBAD-46C0-AA92-336589A5A912}"/>
+                  <a16:creationId xmlns="" xmlns:a16="http://schemas.microsoft.com/office/drawing/2014/main" id="{5A816932-FBAD-46C0-AA92-336589A5A912}"/>
                 </a:ext>
                 <a:ext uri="{C183D7F6-B498-43B3-948B-1728B52AA6E4}">
-                  <adec:decorative xmlns:adec="http://schemas.microsoft.com/office/drawing/2017/decorative" val="1"/>
+                  <adec:decorative xmlns="" xmlns:adec="http://schemas.microsoft.com/office/drawing/2017/decorative" val="1"/>
                 </a:ext>
               </a:extLst>
             </p:cNvPr>
@@ -9252,7 +9285,7 @@
             <p:nvPr>
               <p:extLst>
                 <p:ext uri="{386F3935-93C4-4BCD-93E2-E3B085C9AB24}">
-                  <p16:designElem xmlns:p16="http://schemas.microsoft.com/office/powerpoint/2015/main" val="1"/>
+                  <p16:designElem xmlns="" xmlns:p16="http://schemas.microsoft.com/office/powerpoint/2015/main" val="1"/>
                 </p:ext>
               </p:extLst>
             </p:nvPr>
@@ -9301,10 +9334,10 @@
             <p:cNvPr id="16" name="Freeform 10">
               <a:extLst>
                 <a:ext uri="{FF2B5EF4-FFF2-40B4-BE49-F238E27FC236}">
-                  <a16:creationId xmlns:a16="http://schemas.microsoft.com/office/drawing/2014/main" id="{3D914BDD-E5E0-4DFB-8072-5B498F94A690}"/>
+                  <a16:creationId xmlns="" xmlns:a16="http://schemas.microsoft.com/office/drawing/2014/main" id="{3D914BDD-E5E0-4DFB-8072-5B498F94A690}"/>
                 </a:ext>
                 <a:ext uri="{C183D7F6-B498-43B3-948B-1728B52AA6E4}">
-                  <adec:decorative xmlns:adec="http://schemas.microsoft.com/office/drawing/2017/decorative" val="1"/>
+                  <adec:decorative xmlns="" xmlns:adec="http://schemas.microsoft.com/office/drawing/2017/decorative" val="1"/>
                 </a:ext>
               </a:extLst>
             </p:cNvPr>
@@ -9312,7 +9345,7 @@
             <p:nvPr>
               <p:extLst>
                 <p:ext uri="{386F3935-93C4-4BCD-93E2-E3B085C9AB24}">
-                  <p16:designElem xmlns:p16="http://schemas.microsoft.com/office/powerpoint/2015/main" val="1"/>
+                  <p16:designElem xmlns="" xmlns:p16="http://schemas.microsoft.com/office/powerpoint/2015/main" val="1"/>
                 </p:ext>
               </p:extLst>
             </p:nvPr>
@@ -9367,10 +9400,10 @@
             <p:cNvPr id="17" name="Freeform 11">
               <a:extLst>
                 <a:ext uri="{FF2B5EF4-FFF2-40B4-BE49-F238E27FC236}">
-                  <a16:creationId xmlns:a16="http://schemas.microsoft.com/office/drawing/2014/main" id="{ED9E392E-46C2-4B84-A121-9B2BC452F020}"/>
+                  <a16:creationId xmlns="" xmlns:a16="http://schemas.microsoft.com/office/drawing/2014/main" id="{ED9E392E-46C2-4B84-A121-9B2BC452F020}"/>
                 </a:ext>
                 <a:ext uri="{C183D7F6-B498-43B3-948B-1728B52AA6E4}">
-                  <adec:decorative xmlns:adec="http://schemas.microsoft.com/office/drawing/2017/decorative" val="1"/>
+                  <adec:decorative xmlns="" xmlns:adec="http://schemas.microsoft.com/office/drawing/2017/decorative" val="1"/>
                 </a:ext>
               </a:extLst>
             </p:cNvPr>
@@ -9378,7 +9411,7 @@
             <p:nvPr>
               <p:extLst>
                 <p:ext uri="{386F3935-93C4-4BCD-93E2-E3B085C9AB24}">
-                  <p16:designElem xmlns:p16="http://schemas.microsoft.com/office/powerpoint/2015/main" val="1"/>
+                  <p16:designElem xmlns="" xmlns:p16="http://schemas.microsoft.com/office/powerpoint/2015/main" val="1"/>
                 </p:ext>
               </p:extLst>
             </p:nvPr>
@@ -9447,7 +9480,7 @@
           <p:cNvPr id="2" name="Title 1">
             <a:extLst>
               <a:ext uri="{FF2B5EF4-FFF2-40B4-BE49-F238E27FC236}">
-                <a16:creationId xmlns:a16="http://schemas.microsoft.com/office/drawing/2014/main" id="{612EE23C-66AB-7479-EDC5-D695795B638A}"/>
+                <a16:creationId xmlns="" xmlns:a16="http://schemas.microsoft.com/office/drawing/2014/main" id="{612EE23C-66AB-7479-EDC5-D695795B638A}"/>
               </a:ext>
             </a:extLst>
           </p:cNvPr>
@@ -9492,7 +9525,7 @@
           <p:cNvPr id="8" name="Content Placeholder 7">
             <a:extLst>
               <a:ext uri="{FF2B5EF4-FFF2-40B4-BE49-F238E27FC236}">
-                <a16:creationId xmlns:a16="http://schemas.microsoft.com/office/drawing/2014/main" id="{BFC707FF-0968-29F3-ACF3-4F063E16BF70}"/>
+                <a16:creationId xmlns="" xmlns:a16="http://schemas.microsoft.com/office/drawing/2014/main" id="{BFC707FF-0968-29F3-ACF3-4F063E16BF70}"/>
               </a:ext>
             </a:extLst>
           </p:cNvPr>
@@ -9527,10 +9560,10 @@
           <p:cNvPr id="19" name="Rounded Rectangle 16">
             <a:extLst>
               <a:ext uri="{FF2B5EF4-FFF2-40B4-BE49-F238E27FC236}">
-                <a16:creationId xmlns:a16="http://schemas.microsoft.com/office/drawing/2014/main" id="{21ECAAB0-702B-4C08-B30F-0AFAC3479ADF}"/>
+                <a16:creationId xmlns="" xmlns:a16="http://schemas.microsoft.com/office/drawing/2014/main" id="{21ECAAB0-702B-4C08-B30F-0AFAC3479ADF}"/>
               </a:ext>
               <a:ext uri="{C183D7F6-B498-43B3-948B-1728B52AA6E4}">
-                <adec:decorative xmlns:adec="http://schemas.microsoft.com/office/drawing/2017/decorative" val="1"/>
+                <adec:decorative xmlns="" xmlns:adec="http://schemas.microsoft.com/office/drawing/2017/decorative" val="1"/>
               </a:ext>
             </a:extLst>
           </p:cNvPr>
@@ -9540,7 +9573,7 @@
           <p:nvPr>
             <p:extLst>
               <p:ext uri="{386F3935-93C4-4BCD-93E2-E3B085C9AB24}">
-                <p16:designElem xmlns:p16="http://schemas.microsoft.com/office/powerpoint/2015/main" val="1"/>
+                <p16:designElem xmlns="" xmlns:p16="http://schemas.microsoft.com/office/powerpoint/2015/main" val="1"/>
               </p:ext>
             </p:extLst>
           </p:nvPr>
@@ -9612,7 +9645,7 @@
           <p:cNvPr id="4" name="Picture 4" descr="Chart&#10;&#10;Description automatically generated">
             <a:extLst>
               <a:ext uri="{FF2B5EF4-FFF2-40B4-BE49-F238E27FC236}">
-                <a16:creationId xmlns:a16="http://schemas.microsoft.com/office/drawing/2014/main" id="{BBAE7E6F-E61A-AA73-20F3-7E7DBF118C78}"/>
+                <a16:creationId xmlns="" xmlns:a16="http://schemas.microsoft.com/office/drawing/2014/main" id="{BBAE7E6F-E61A-AA73-20F3-7E7DBF118C78}"/>
               </a:ext>
             </a:extLst>
           </p:cNvPr>
@@ -9640,13 +9673,20 @@
     </p:spTree>
     <p:extLst>
       <p:ext uri="{BB962C8B-B14F-4D97-AF65-F5344CB8AC3E}">
-        <p14:creationId xmlns:p14="http://schemas.microsoft.com/office/powerpoint/2010/main" val="1584206450"/>
+        <p14:creationId xmlns="" xmlns:p14="http://schemas.microsoft.com/office/powerpoint/2010/main" val="1584206450"/>
       </p:ext>
     </p:extLst>
   </p:cSld>
   <p:clrMapOvr>
     <a:masterClrMapping/>
   </p:clrMapOvr>
+  <p:timing>
+    <p:tnLst>
+      <p:par>
+        <p:cTn id="1" dur="indefinite" restart="never" nodeType="tmRoot"/>
+      </p:par>
+    </p:tnLst>
+  </p:timing>
 </p:sld>
 </file>
 
@@ -9672,7 +9712,7 @@
           <p:cNvPr id="2" name="Title 1">
             <a:extLst>
               <a:ext uri="{FF2B5EF4-FFF2-40B4-BE49-F238E27FC236}">
-                <a16:creationId xmlns:a16="http://schemas.microsoft.com/office/drawing/2014/main" id="{587129A2-8DBF-24C3-E467-F6799A54C100}"/>
+                <a16:creationId xmlns="" xmlns:a16="http://schemas.microsoft.com/office/drawing/2014/main" id="{587129A2-8DBF-24C3-E467-F6799A54C100}"/>
               </a:ext>
             </a:extLst>
           </p:cNvPr>
@@ -9708,7 +9748,7 @@
           <p:cNvPr id="7" name="Content Placeholder 6">
             <a:extLst>
               <a:ext uri="{FF2B5EF4-FFF2-40B4-BE49-F238E27FC236}">
-                <a16:creationId xmlns:a16="http://schemas.microsoft.com/office/drawing/2014/main" id="{8B0E43EF-8107-2361-8897-6D41B2B1B384}"/>
+                <a16:creationId xmlns="" xmlns:a16="http://schemas.microsoft.com/office/drawing/2014/main" id="{8B0E43EF-8107-2361-8897-6D41B2B1B384}"/>
               </a:ext>
             </a:extLst>
           </p:cNvPr>
@@ -10368,13 +10408,20 @@
     </p:spTree>
     <p:extLst>
       <p:ext uri="{BB962C8B-B14F-4D97-AF65-F5344CB8AC3E}">
-        <p14:creationId xmlns:p14="http://schemas.microsoft.com/office/powerpoint/2010/main" val="1340431855"/>
+        <p14:creationId xmlns="" xmlns:p14="http://schemas.microsoft.com/office/powerpoint/2010/main" val="1340431855"/>
       </p:ext>
     </p:extLst>
   </p:cSld>
   <p:clrMapOvr>
     <a:masterClrMapping/>
   </p:clrMapOvr>
+  <p:timing>
+    <p:tnLst>
+      <p:par>
+        <p:cTn id="1" dur="indefinite" restart="never" nodeType="tmRoot"/>
+      </p:par>
+    </p:tnLst>
+  </p:timing>
 </p:sld>
 </file>
 
@@ -10400,7 +10447,7 @@
           <p:cNvPr id="2" name="Title 1">
             <a:extLst>
               <a:ext uri="{FF2B5EF4-FFF2-40B4-BE49-F238E27FC236}">
-                <a16:creationId xmlns:a16="http://schemas.microsoft.com/office/drawing/2014/main" id="{587129A2-8DBF-24C3-E467-F6799A54C100}"/>
+                <a16:creationId xmlns="" xmlns:a16="http://schemas.microsoft.com/office/drawing/2014/main" id="{587129A2-8DBF-24C3-E467-F6799A54C100}"/>
               </a:ext>
             </a:extLst>
           </p:cNvPr>
@@ -10450,7 +10497,7 @@
           <p:cNvPr id="3" name="Content Placeholder 2">
             <a:extLst>
               <a:ext uri="{FF2B5EF4-FFF2-40B4-BE49-F238E27FC236}">
-                <a16:creationId xmlns:a16="http://schemas.microsoft.com/office/drawing/2014/main" id="{8F12BDF4-E341-41BB-77F2-40FDDE04BD96}"/>
+                <a16:creationId xmlns="" xmlns:a16="http://schemas.microsoft.com/office/drawing/2014/main" id="{8F12BDF4-E341-41BB-77F2-40FDDE04BD96}"/>
               </a:ext>
             </a:extLst>
           </p:cNvPr>
@@ -10638,7 +10685,7 @@
           <p:cNvPr id="4" name="Picture 4" descr="Chart, pie chart&#10;&#10;Description automatically generated">
             <a:extLst>
               <a:ext uri="{FF2B5EF4-FFF2-40B4-BE49-F238E27FC236}">
-                <a16:creationId xmlns:a16="http://schemas.microsoft.com/office/drawing/2014/main" id="{7F77AD0F-5F92-7825-DC2B-2A57050907FE}"/>
+                <a16:creationId xmlns="" xmlns:a16="http://schemas.microsoft.com/office/drawing/2014/main" id="{7F77AD0F-5F92-7825-DC2B-2A57050907FE}"/>
               </a:ext>
             </a:extLst>
           </p:cNvPr>
@@ -10666,13 +10713,20 @@
     </p:spTree>
     <p:extLst>
       <p:ext uri="{BB962C8B-B14F-4D97-AF65-F5344CB8AC3E}">
-        <p14:creationId xmlns:p14="http://schemas.microsoft.com/office/powerpoint/2010/main" val="1105754071"/>
+        <p14:creationId xmlns="" xmlns:p14="http://schemas.microsoft.com/office/powerpoint/2010/main" val="1105754071"/>
       </p:ext>
     </p:extLst>
   </p:cSld>
   <p:clrMapOvr>
     <a:masterClrMapping/>
   </p:clrMapOvr>
+  <p:timing>
+    <p:tnLst>
+      <p:par>
+        <p:cTn id="1" dur="indefinite" restart="never" nodeType="tmRoot"/>
+      </p:par>
+    </p:tnLst>
+  </p:timing>
 </p:sld>
 </file>
 
@@ -10698,7 +10752,7 @@
           <p:cNvPr id="2" name="Title 1">
             <a:extLst>
               <a:ext uri="{FF2B5EF4-FFF2-40B4-BE49-F238E27FC236}">
-                <a16:creationId xmlns:a16="http://schemas.microsoft.com/office/drawing/2014/main" id="{587129A2-8DBF-24C3-E467-F6799A54C100}"/>
+                <a16:creationId xmlns="" xmlns:a16="http://schemas.microsoft.com/office/drawing/2014/main" id="{587129A2-8DBF-24C3-E467-F6799A54C100}"/>
               </a:ext>
             </a:extLst>
           </p:cNvPr>
@@ -10734,7 +10788,7 @@
           <p:cNvPr id="6" name="Content Placeholder 5">
             <a:extLst>
               <a:ext uri="{FF2B5EF4-FFF2-40B4-BE49-F238E27FC236}">
-                <a16:creationId xmlns:a16="http://schemas.microsoft.com/office/drawing/2014/main" id="{E9F378E1-DD9D-B714-C473-F37ED9F13D1A}"/>
+                <a16:creationId xmlns="" xmlns:a16="http://schemas.microsoft.com/office/drawing/2014/main" id="{E9F378E1-DD9D-B714-C473-F37ED9F13D1A}"/>
               </a:ext>
             </a:extLst>
           </p:cNvPr>
@@ -10784,7 +10838,7 @@
               </a:rPr>
               <a:t>DecisionTreeClassifier</a:t>
             </a:r>
-            <a:endParaRPr lang="en-US" sz="2000">
+            <a:endParaRPr lang="en-US" sz="2000" dirty="0">
               <a:latin typeface="Arial"/>
               <a:cs typeface="Arial"/>
             </a:endParaRPr>
@@ -10802,7 +10856,7 @@
               </a:rPr>
               <a:t>KNeighborsClassifier</a:t>
             </a:r>
-            <a:endParaRPr lang="en-US" sz="2000">
+            <a:endParaRPr lang="en-US" sz="2000" dirty="0">
               <a:latin typeface="Arial"/>
               <a:cs typeface="Arial"/>
             </a:endParaRPr>
@@ -10820,7 +10874,7 @@
               </a:rPr>
               <a:t>MLPClassifier</a:t>
             </a:r>
-            <a:endParaRPr lang="en-US" sz="2000">
+            <a:endParaRPr lang="en-US" sz="2000" dirty="0">
               <a:latin typeface="Arial"/>
               <a:cs typeface="Arial"/>
             </a:endParaRPr>
@@ -10832,13 +10886,13 @@
               </a:buClr>
             </a:pPr>
             <a:r>
-              <a:rPr lang="en-US" sz="2000" dirty="0" err="1">
-                <a:latin typeface="Arial"/>
-                <a:cs typeface="Arial"/>
-              </a:rPr>
-              <a:t>CategoricalNB</a:t>
-            </a:r>
-            <a:endParaRPr lang="en-US" sz="2000">
+              <a:rPr lang="en-US" sz="2000" dirty="0" smtClean="0">
+                <a:latin typeface="Arial"/>
+                <a:cs typeface="Arial"/>
+              </a:rPr>
+              <a:t>SVC</a:t>
+            </a:r>
+            <a:endParaRPr lang="en-US" sz="2000" dirty="0">
               <a:latin typeface="Arial"/>
               <a:cs typeface="Arial"/>
             </a:endParaRPr>
@@ -10856,7 +10910,7 @@
               </a:rPr>
               <a:t>RandomForestClassifier</a:t>
             </a:r>
-            <a:endParaRPr lang="en-US" sz="2000">
+            <a:endParaRPr lang="en-US" sz="2000" dirty="0">
               <a:latin typeface="Arial"/>
               <a:cs typeface="Arial"/>
             </a:endParaRPr>
@@ -10868,13 +10922,13 @@
               </a:buClr>
             </a:pPr>
             <a:r>
-              <a:rPr lang="en-US" sz="2000" err="1">
+              <a:rPr lang="en-US" sz="2000" dirty="0" err="1">
                 <a:latin typeface="Arial"/>
                 <a:cs typeface="Arial"/>
               </a:rPr>
               <a:t>XGBClassifier</a:t>
             </a:r>
-            <a:endParaRPr lang="en-US" sz="2000">
+            <a:endParaRPr lang="en-US" sz="2000" dirty="0">
               <a:latin typeface="Arial"/>
               <a:cs typeface="Arial"/>
             </a:endParaRPr>
@@ -10932,7 +10986,7 @@
           <p:cNvPr id="11" name="Content Placeholder 5">
             <a:extLst>
               <a:ext uri="{FF2B5EF4-FFF2-40B4-BE49-F238E27FC236}">
-                <a16:creationId xmlns:a16="http://schemas.microsoft.com/office/drawing/2014/main" id="{5A415E35-9099-3797-B307-E8A5D599DFCB}"/>
+                <a16:creationId xmlns="" xmlns:a16="http://schemas.microsoft.com/office/drawing/2014/main" id="{5A415E35-9099-3797-B307-E8A5D599DFCB}"/>
               </a:ext>
             </a:extLst>
           </p:cNvPr>
@@ -10943,8 +10997,8 @@
         </p:nvSpPr>
         <p:spPr>
           <a:xfrm>
-            <a:off x="6649385" y="1185232"/>
-            <a:ext cx="3527942" cy="4372779"/>
+            <a:off x="6649385" y="939114"/>
+            <a:ext cx="3527942" cy="3731741"/>
           </a:xfrm>
           <a:prstGeom prst="rect">
             <a:avLst/>
@@ -11218,12 +11272,16 @@
               </a:buClr>
             </a:pPr>
             <a:r>
-              <a:rPr lang="en-US" sz="2000" dirty="0" err="1">
-                <a:latin typeface="Arial"/>
-                <a:cs typeface="Arial"/>
-              </a:rPr>
-              <a:t>AgglomerativeClustering</a:t>
-            </a:r>
+              <a:rPr lang="en-US" sz="2000" dirty="0" err="1" smtClean="0">
+                <a:latin typeface="Arial"/>
+                <a:cs typeface="Arial"/>
+              </a:rPr>
+              <a:t>KModes</a:t>
+            </a:r>
+            <a:endParaRPr lang="en-US" sz="2000" dirty="0">
+              <a:latin typeface="Arial"/>
+              <a:cs typeface="Arial"/>
+            </a:endParaRPr>
           </a:p>
           <a:p>
             <a:pPr marL="342900" indent="-342900">
@@ -11232,11 +11290,63 @@
               </a:buClr>
             </a:pPr>
             <a:r>
-              <a:rPr lang="en-US" sz="2000" dirty="0">
-                <a:latin typeface="Arial"/>
-                <a:cs typeface="Arial"/>
-              </a:rPr>
-              <a:t>DBSCAN</a:t>
+              <a:rPr lang="en-US" sz="2000" dirty="0" err="1" smtClean="0">
+                <a:latin typeface="Arial"/>
+                <a:cs typeface="Arial"/>
+              </a:rPr>
+              <a:t>GaussianMixture</a:t>
+            </a:r>
+            <a:endParaRPr lang="en-US" sz="2000" dirty="0" smtClean="0">
+              <a:latin typeface="Arial"/>
+              <a:cs typeface="Arial"/>
+            </a:endParaRPr>
+          </a:p>
+          <a:p>
+            <a:pPr marL="342900" indent="-342900">
+              <a:buClr>
+                <a:srgbClr val="1287C3"/>
+              </a:buClr>
+              <a:buNone/>
+            </a:pPr>
+            <a:endParaRPr lang="en-US" sz="2000" dirty="0" smtClean="0">
+              <a:latin typeface="Arial"/>
+              <a:cs typeface="Arial"/>
+            </a:endParaRPr>
+          </a:p>
+          <a:p>
+            <a:pPr marL="342900" indent="-342900">
+              <a:buClr>
+                <a:srgbClr val="1287C3"/>
+              </a:buClr>
+              <a:buNone/>
+            </a:pPr>
+            <a:r>
+              <a:rPr lang="en-US" dirty="0" err="1" smtClean="0">
+                <a:latin typeface="Arial"/>
+                <a:cs typeface="Arial"/>
+              </a:rPr>
+              <a:t>Pravila</a:t>
+            </a:r>
+            <a:r>
+              <a:rPr lang="en-US" dirty="0" smtClean="0">
+                <a:latin typeface="Arial"/>
+                <a:cs typeface="Arial"/>
+              </a:rPr>
+              <a:t> </a:t>
+            </a:r>
+            <a:r>
+              <a:rPr lang="en-US" dirty="0" err="1" smtClean="0">
+                <a:latin typeface="Arial"/>
+                <a:cs typeface="Arial"/>
+              </a:rPr>
+              <a:t>pridru</a:t>
+            </a:r>
+            <a:r>
+              <a:rPr lang="sr-Latn-RS" dirty="0" smtClean="0">
+                <a:latin typeface="Arial"/>
+                <a:cs typeface="Arial"/>
+              </a:rPr>
+              <a:t>živanja:</a:t>
             </a:r>
           </a:p>
           <a:p>
@@ -11246,420 +11356,36 @@
               </a:buClr>
             </a:pPr>
             <a:r>
-              <a:rPr lang="en-US" sz="2000" dirty="0" err="1">
-                <a:latin typeface="Arial"/>
-                <a:cs typeface="Arial"/>
-              </a:rPr>
-              <a:t>SpectralClustering</a:t>
-            </a:r>
-          </a:p>
-          <a:p>
-            <a:pPr marL="342900" indent="-342900">
-              <a:buClr>
-                <a:srgbClr val="1287C3"/>
-              </a:buClr>
-            </a:pPr>
+              <a:rPr lang="sr-Latn-RS" sz="2000" dirty="0" smtClean="0">
+                <a:latin typeface="Arial"/>
+                <a:cs typeface="Arial"/>
+              </a:rPr>
+              <a:t>Apriori</a:t>
+            </a:r>
             <a:endParaRPr lang="en-US" sz="2000" dirty="0">
               <a:latin typeface="Arial"/>
               <a:cs typeface="Arial"/>
             </a:endParaRPr>
           </a:p>
-          <a:p>
-            <a:pPr marL="0" indent="0">
-              <a:buClr>
-                <a:srgbClr val="1287C3"/>
-              </a:buClr>
-              <a:buNone/>
-            </a:pPr>
-            <a:endParaRPr lang="en-US" dirty="0">
-              <a:latin typeface="Arial"/>
-              <a:cs typeface="Arial"/>
-            </a:endParaRPr>
-          </a:p>
-          <a:p>
-            <a:pPr marL="342900" indent="-342900">
-              <a:buClr>
-                <a:srgbClr val="1287C3"/>
-              </a:buClr>
-              <a:buFont typeface="Arial"/>
-              <a:buChar char="•"/>
-            </a:pPr>
-            <a:endParaRPr lang="en-US" dirty="0">
-              <a:latin typeface="Arial"/>
-              <a:cs typeface="Arial"/>
-            </a:endParaRPr>
-          </a:p>
-          <a:p>
-            <a:pPr marL="0" indent="0">
-              <a:buClr>
-                <a:srgbClr val="1287C3"/>
-              </a:buClr>
-              <a:buNone/>
-            </a:pPr>
-            <a:endParaRPr lang="en-US" dirty="0">
-              <a:latin typeface="Arial"/>
-              <a:cs typeface="Arial"/>
-            </a:endParaRPr>
-          </a:p>
-        </p:txBody>
-      </p:sp>
-      <p:sp>
-        <p:nvSpPr>
-          <p:cNvPr id="13" name="Content Placeholder 5">
-            <a:extLst>
-              <a:ext uri="{FF2B5EF4-FFF2-40B4-BE49-F238E27FC236}">
-                <a16:creationId xmlns:a16="http://schemas.microsoft.com/office/drawing/2014/main" id="{2F8CFBC9-531A-A4C5-BA6D-9527615C2681}"/>
-              </a:ext>
-            </a:extLst>
-          </p:cNvPr>
-          <p:cNvSpPr txBox="1">
-            <a:spLocks/>
-          </p:cNvSpPr>
-          <p:nvPr/>
-        </p:nvSpPr>
-        <p:spPr>
-          <a:xfrm>
-            <a:off x="6649384" y="3517135"/>
-            <a:ext cx="3527942" cy="4372779"/>
-          </a:xfrm>
-          <a:prstGeom prst="rect">
-            <a:avLst/>
-          </a:prstGeom>
-        </p:spPr>
-        <p:txBody>
-          <a:bodyPr vert="horz" lIns="91440" tIns="45720" rIns="91440" bIns="45720" rtlCol="0" anchor="ctr">
-            <a:normAutofit/>
-          </a:bodyPr>
-          <a:lstStyle>
-            <a:lvl1pPr marL="285750" indent="-285750" algn="l" defTabSz="457200" rtl="0" eaLnBrk="1" latinLnBrk="0" hangingPunct="1">
-              <a:spcBef>
-                <a:spcPct val="20000"/>
-              </a:spcBef>
-              <a:spcAft>
-                <a:spcPts val="600"/>
-              </a:spcAft>
-              <a:buClr>
-                <a:schemeClr val="accent1">
-                  <a:lumMod val="75000"/>
-                </a:schemeClr>
-              </a:buClr>
-              <a:buSzPct val="145000"/>
-              <a:buFont typeface="Arial"/>
-              <a:buChar char="•"/>
-              <a:defRPr sz="2400" kern="1200" cap="none">
-                <a:solidFill>
-                  <a:schemeClr val="tx1"/>
-                </a:solidFill>
-                <a:effectLst/>
-                <a:latin typeface="+mn-lt"/>
-                <a:ea typeface="+mn-ea"/>
-                <a:cs typeface="+mn-cs"/>
-              </a:defRPr>
-            </a:lvl1pPr>
-            <a:lvl2pPr marL="742950" indent="-285750" algn="l" defTabSz="457200" rtl="0" eaLnBrk="1" latinLnBrk="0" hangingPunct="1">
-              <a:spcBef>
-                <a:spcPct val="20000"/>
-              </a:spcBef>
-              <a:spcAft>
-                <a:spcPts val="600"/>
-              </a:spcAft>
-              <a:buClr>
-                <a:schemeClr val="accent1">
-                  <a:lumMod val="75000"/>
-                </a:schemeClr>
-              </a:buClr>
-              <a:buSzPct val="145000"/>
-              <a:buFont typeface="Arial"/>
-              <a:buChar char="•"/>
-              <a:defRPr sz="2000" kern="1200" cap="none">
-                <a:solidFill>
-                  <a:schemeClr val="tx1"/>
-                </a:solidFill>
-                <a:effectLst/>
-                <a:latin typeface="+mn-lt"/>
-                <a:ea typeface="+mn-ea"/>
-                <a:cs typeface="+mn-cs"/>
-              </a:defRPr>
-            </a:lvl2pPr>
-            <a:lvl3pPr marL="1200150" indent="-285750" algn="l" defTabSz="457200" rtl="0" eaLnBrk="1" latinLnBrk="0" hangingPunct="1">
-              <a:spcBef>
-                <a:spcPct val="20000"/>
-              </a:spcBef>
-              <a:spcAft>
-                <a:spcPts val="600"/>
-              </a:spcAft>
-              <a:buClr>
-                <a:schemeClr val="accent1">
-                  <a:lumMod val="75000"/>
-                </a:schemeClr>
-              </a:buClr>
-              <a:buSzPct val="145000"/>
-              <a:buFont typeface="Arial"/>
-              <a:buChar char="•"/>
-              <a:defRPr sz="1800" kern="1200" cap="none">
-                <a:solidFill>
-                  <a:schemeClr val="tx1"/>
-                </a:solidFill>
-                <a:effectLst/>
-                <a:latin typeface="+mn-lt"/>
-                <a:ea typeface="+mn-ea"/>
-                <a:cs typeface="+mn-cs"/>
-              </a:defRPr>
-            </a:lvl3pPr>
-            <a:lvl4pPr marL="1543050" indent="-171450" algn="l" defTabSz="457200" rtl="0" eaLnBrk="1" latinLnBrk="0" hangingPunct="1">
-              <a:spcBef>
-                <a:spcPct val="20000"/>
-              </a:spcBef>
-              <a:spcAft>
-                <a:spcPts val="600"/>
-              </a:spcAft>
-              <a:buClr>
-                <a:schemeClr val="accent1">
-                  <a:lumMod val="75000"/>
-                </a:schemeClr>
-              </a:buClr>
-              <a:buSzPct val="145000"/>
-              <a:buFont typeface="Arial"/>
-              <a:buChar char="•"/>
-              <a:defRPr sz="1600" kern="1200" cap="none">
-                <a:solidFill>
-                  <a:schemeClr val="tx1"/>
-                </a:solidFill>
-                <a:effectLst/>
-                <a:latin typeface="+mn-lt"/>
-                <a:ea typeface="+mn-ea"/>
-                <a:cs typeface="+mn-cs"/>
-              </a:defRPr>
-            </a:lvl4pPr>
-            <a:lvl5pPr marL="2000250" indent="-171450" algn="l" defTabSz="457200" rtl="0" eaLnBrk="1" latinLnBrk="0" hangingPunct="1">
-              <a:spcBef>
-                <a:spcPct val="20000"/>
-              </a:spcBef>
-              <a:spcAft>
-                <a:spcPts val="600"/>
-              </a:spcAft>
-              <a:buClr>
-                <a:schemeClr val="accent1">
-                  <a:lumMod val="75000"/>
-                </a:schemeClr>
-              </a:buClr>
-              <a:buSzPct val="145000"/>
-              <a:buFont typeface="Arial"/>
-              <a:buChar char="•"/>
-              <a:defRPr sz="1400" kern="1200" cap="none">
-                <a:solidFill>
-                  <a:schemeClr val="tx1"/>
-                </a:solidFill>
-                <a:effectLst/>
-                <a:latin typeface="+mn-lt"/>
-                <a:ea typeface="+mn-ea"/>
-                <a:cs typeface="+mn-cs"/>
-              </a:defRPr>
-            </a:lvl5pPr>
-            <a:lvl6pPr marL="2514600" indent="-228600" algn="l" defTabSz="457200" rtl="0" eaLnBrk="1" latinLnBrk="0" hangingPunct="1">
-              <a:spcBef>
-                <a:spcPct val="20000"/>
-              </a:spcBef>
-              <a:spcAft>
-                <a:spcPts val="600"/>
-              </a:spcAft>
-              <a:buClr>
-                <a:schemeClr val="accent1">
-                  <a:lumMod val="75000"/>
-                </a:schemeClr>
-              </a:buClr>
-              <a:buSzPct val="145000"/>
-              <a:buFont typeface="Arial"/>
-              <a:buChar char="•"/>
-              <a:defRPr sz="1400" kern="1200" cap="none">
-                <a:solidFill>
-                  <a:schemeClr val="tx1"/>
-                </a:solidFill>
-                <a:effectLst/>
-                <a:latin typeface="+mn-lt"/>
-                <a:ea typeface="+mn-ea"/>
-                <a:cs typeface="+mn-cs"/>
-              </a:defRPr>
-            </a:lvl6pPr>
-            <a:lvl7pPr marL="2971800" indent="-228600" algn="l" defTabSz="457200" rtl="0" eaLnBrk="1" latinLnBrk="0" hangingPunct="1">
-              <a:spcBef>
-                <a:spcPct val="20000"/>
-              </a:spcBef>
-              <a:spcAft>
-                <a:spcPts val="600"/>
-              </a:spcAft>
-              <a:buClr>
-                <a:schemeClr val="accent1">
-                  <a:lumMod val="75000"/>
-                </a:schemeClr>
-              </a:buClr>
-              <a:buSzPct val="145000"/>
-              <a:buFont typeface="Arial"/>
-              <a:buChar char="•"/>
-              <a:defRPr sz="1400" kern="1200" cap="none">
-                <a:solidFill>
-                  <a:schemeClr val="tx1"/>
-                </a:solidFill>
-                <a:effectLst/>
-                <a:latin typeface="+mn-lt"/>
-                <a:ea typeface="+mn-ea"/>
-                <a:cs typeface="+mn-cs"/>
-              </a:defRPr>
-            </a:lvl7pPr>
-            <a:lvl8pPr marL="3429000" indent="-228600" algn="l" defTabSz="457200" rtl="0" eaLnBrk="1" latinLnBrk="0" hangingPunct="1">
-              <a:spcBef>
-                <a:spcPct val="20000"/>
-              </a:spcBef>
-              <a:spcAft>
-                <a:spcPts val="600"/>
-              </a:spcAft>
-              <a:buClr>
-                <a:schemeClr val="accent1">
-                  <a:lumMod val="75000"/>
-                </a:schemeClr>
-              </a:buClr>
-              <a:buSzPct val="145000"/>
-              <a:buFont typeface="Arial"/>
-              <a:buChar char="•"/>
-              <a:defRPr sz="1400" kern="1200" cap="none">
-                <a:solidFill>
-                  <a:schemeClr val="tx1"/>
-                </a:solidFill>
-                <a:effectLst/>
-                <a:latin typeface="+mn-lt"/>
-                <a:ea typeface="+mn-ea"/>
-                <a:cs typeface="+mn-cs"/>
-              </a:defRPr>
-            </a:lvl8pPr>
-            <a:lvl9pPr marL="3886200" indent="-228600" algn="l" defTabSz="457200" rtl="0" eaLnBrk="1" latinLnBrk="0" hangingPunct="1">
-              <a:spcBef>
-                <a:spcPct val="20000"/>
-              </a:spcBef>
-              <a:spcAft>
-                <a:spcPts val="600"/>
-              </a:spcAft>
-              <a:buClr>
-                <a:schemeClr val="accent1">
-                  <a:lumMod val="75000"/>
-                </a:schemeClr>
-              </a:buClr>
-              <a:buSzPct val="145000"/>
-              <a:buFont typeface="Arial"/>
-              <a:buChar char="•"/>
-              <a:defRPr sz="1400" kern="1200" cap="none">
-                <a:solidFill>
-                  <a:schemeClr val="tx1"/>
-                </a:solidFill>
-                <a:effectLst/>
-                <a:latin typeface="+mn-lt"/>
-                <a:ea typeface="+mn-ea"/>
-                <a:cs typeface="+mn-cs"/>
-              </a:defRPr>
-            </a:lvl9pPr>
-          </a:lstStyle>
-          <a:p>
-            <a:pPr marL="0" indent="0">
-              <a:buNone/>
-            </a:pPr>
-            <a:r>
-              <a:rPr lang="en-US" dirty="0" err="1">
-                <a:latin typeface="Arial"/>
-                <a:cs typeface="Arial"/>
-              </a:rPr>
-              <a:t>Pravila</a:t>
-            </a:r>
-            <a:r>
-              <a:rPr lang="en-US" dirty="0">
-                <a:latin typeface="Arial"/>
-                <a:cs typeface="Arial"/>
-              </a:rPr>
-              <a:t> </a:t>
-            </a:r>
-            <a:r>
-              <a:rPr lang="en-US" dirty="0" err="1">
-                <a:latin typeface="Arial"/>
-                <a:cs typeface="Arial"/>
-              </a:rPr>
-              <a:t>pridruživanja</a:t>
-            </a:r>
-            <a:r>
-              <a:rPr lang="en-US" dirty="0">
-                <a:latin typeface="Arial"/>
-                <a:cs typeface="Arial"/>
-              </a:rPr>
-              <a:t>:</a:t>
-            </a:r>
-          </a:p>
-          <a:p>
-            <a:pPr marL="342900" indent="-342900"/>
-            <a:r>
-              <a:rPr lang="en-US" sz="2000" dirty="0" err="1">
-                <a:latin typeface="Arial"/>
-                <a:cs typeface="Arial"/>
-              </a:rPr>
-              <a:t>Apriori</a:t>
-            </a:r>
-          </a:p>
-          <a:p>
-            <a:pPr marL="342900" indent="-342900">
-              <a:buClr>
-                <a:srgbClr val="1287C3"/>
-              </a:buClr>
-            </a:pPr>
-            <a:endParaRPr lang="en-US" sz="2000" dirty="0">
-              <a:latin typeface="Arial"/>
-              <a:cs typeface="Arial"/>
-            </a:endParaRPr>
-          </a:p>
-          <a:p>
-            <a:pPr marL="0" indent="0">
-              <a:buClr>
-                <a:srgbClr val="1287C3"/>
-              </a:buClr>
-              <a:buNone/>
-            </a:pPr>
-            <a:endParaRPr lang="en-US" dirty="0">
-              <a:latin typeface="Arial"/>
-              <a:cs typeface="Arial"/>
-            </a:endParaRPr>
-          </a:p>
-          <a:p>
-            <a:pPr marL="342900" indent="-342900">
-              <a:buClr>
-                <a:srgbClr val="1287C3"/>
-              </a:buClr>
-              <a:buFont typeface="Arial"/>
-              <a:buChar char="•"/>
-            </a:pPr>
-            <a:endParaRPr lang="en-US" dirty="0">
-              <a:latin typeface="Arial"/>
-              <a:cs typeface="Arial"/>
-            </a:endParaRPr>
-          </a:p>
-          <a:p>
-            <a:pPr marL="0" indent="0">
-              <a:buClr>
-                <a:srgbClr val="1287C3"/>
-              </a:buClr>
-              <a:buNone/>
-            </a:pPr>
-            <a:endParaRPr lang="en-US" dirty="0">
-              <a:latin typeface="Arial"/>
-              <a:cs typeface="Arial"/>
-            </a:endParaRPr>
-          </a:p>
         </p:txBody>
       </p:sp>
     </p:spTree>
     <p:extLst>
       <p:ext uri="{BB962C8B-B14F-4D97-AF65-F5344CB8AC3E}">
-        <p14:creationId xmlns:p14="http://schemas.microsoft.com/office/powerpoint/2010/main" val="3792751982"/>
+        <p14:creationId xmlns="" xmlns:p14="http://schemas.microsoft.com/office/powerpoint/2010/main" val="3792751982"/>
       </p:ext>
     </p:extLst>
   </p:cSld>
   <p:clrMapOvr>
     <a:masterClrMapping/>
   </p:clrMapOvr>
+  <p:timing>
+    <p:tnLst>
+      <p:par>
+        <p:cTn id="1" dur="indefinite" restart="never" nodeType="tmRoot"/>
+      </p:par>
+    </p:tnLst>
+  </p:timing>
 </p:sld>
 </file>
 
@@ -11685,7 +11411,7 @@
           <p:cNvPr id="2" name="Title 1">
             <a:extLst>
               <a:ext uri="{FF2B5EF4-FFF2-40B4-BE49-F238E27FC236}">
-                <a16:creationId xmlns:a16="http://schemas.microsoft.com/office/drawing/2014/main" id="{587129A2-8DBF-24C3-E467-F6799A54C100}"/>
+                <a16:creationId xmlns="" xmlns:a16="http://schemas.microsoft.com/office/drawing/2014/main" id="{587129A2-8DBF-24C3-E467-F6799A54C100}"/>
               </a:ext>
             </a:extLst>
           </p:cNvPr>
@@ -11721,7 +11447,7 @@
           <p:cNvPr id="5" name="Picture 6" descr="Chart, line chart&#10;&#10;Description automatically generated">
             <a:extLst>
               <a:ext uri="{FF2B5EF4-FFF2-40B4-BE49-F238E27FC236}">
-                <a16:creationId xmlns:a16="http://schemas.microsoft.com/office/drawing/2014/main" id="{01FBE212-0A21-3FBA-C766-45F3F8B871B8}"/>
+                <a16:creationId xmlns="" xmlns:a16="http://schemas.microsoft.com/office/drawing/2014/main" id="{01FBE212-0A21-3FBA-C766-45F3F8B871B8}"/>
               </a:ext>
             </a:extLst>
           </p:cNvPr>
@@ -11751,7 +11477,7 @@
           <p:cNvPr id="7" name="Picture 7" descr="Chart, bar chart&#10;&#10;Description automatically generated">
             <a:extLst>
               <a:ext uri="{FF2B5EF4-FFF2-40B4-BE49-F238E27FC236}">
-                <a16:creationId xmlns:a16="http://schemas.microsoft.com/office/drawing/2014/main" id="{9386D8E2-8A9D-4FCD-21EF-F7833054FA54}"/>
+                <a16:creationId xmlns="" xmlns:a16="http://schemas.microsoft.com/office/drawing/2014/main" id="{9386D8E2-8A9D-4FCD-21EF-F7833054FA54}"/>
               </a:ext>
             </a:extLst>
           </p:cNvPr>
@@ -11779,13 +11505,20 @@
     </p:spTree>
     <p:extLst>
       <p:ext uri="{BB962C8B-B14F-4D97-AF65-F5344CB8AC3E}">
-        <p14:creationId xmlns:p14="http://schemas.microsoft.com/office/powerpoint/2010/main" val="2709870584"/>
+        <p14:creationId xmlns="" xmlns:p14="http://schemas.microsoft.com/office/powerpoint/2010/main" val="2709870584"/>
       </p:ext>
     </p:extLst>
   </p:cSld>
   <p:clrMapOvr>
     <a:masterClrMapping/>
   </p:clrMapOvr>
+  <p:timing>
+    <p:tnLst>
+      <p:par>
+        <p:cTn id="1" dur="indefinite" restart="never" nodeType="tmRoot"/>
+      </p:par>
+    </p:tnLst>
+  </p:timing>
 </p:sld>
 </file>
 
@@ -11811,7 +11544,7 @@
           <p:cNvPr id="2" name="Title 1">
             <a:extLst>
               <a:ext uri="{FF2B5EF4-FFF2-40B4-BE49-F238E27FC236}">
-                <a16:creationId xmlns:a16="http://schemas.microsoft.com/office/drawing/2014/main" id="{587129A2-8DBF-24C3-E467-F6799A54C100}"/>
+                <a16:creationId xmlns="" xmlns:a16="http://schemas.microsoft.com/office/drawing/2014/main" id="{587129A2-8DBF-24C3-E467-F6799A54C100}"/>
               </a:ext>
             </a:extLst>
           </p:cNvPr>
@@ -11861,7 +11594,7 @@
           <p:cNvPr id="3" name="Picture 3" descr="Chart&#10;&#10;Description automatically generated">
             <a:extLst>
               <a:ext uri="{FF2B5EF4-FFF2-40B4-BE49-F238E27FC236}">
-                <a16:creationId xmlns:a16="http://schemas.microsoft.com/office/drawing/2014/main" id="{A93A6994-CFE7-EA46-735B-7E093CD28B0A}"/>
+                <a16:creationId xmlns="" xmlns:a16="http://schemas.microsoft.com/office/drawing/2014/main" id="{A93A6994-CFE7-EA46-735B-7E093CD28B0A}"/>
               </a:ext>
             </a:extLst>
           </p:cNvPr>
@@ -11878,8 +11611,8 @@
         </p:blipFill>
         <p:spPr>
           <a:xfrm>
-            <a:off x="2664177" y="3222027"/>
-            <a:ext cx="9055570" cy="3000982"/>
+            <a:off x="2664177" y="3243573"/>
+            <a:ext cx="9055570" cy="2957889"/>
           </a:xfrm>
           <a:prstGeom prst="rect">
             <a:avLst/>
@@ -11891,7 +11624,7 @@
           <p:cNvPr id="4" name="TextBox 3">
             <a:extLst>
               <a:ext uri="{FF2B5EF4-FFF2-40B4-BE49-F238E27FC236}">
-                <a16:creationId xmlns:a16="http://schemas.microsoft.com/office/drawing/2014/main" id="{3914DB82-8277-D770-D502-B5862CD3A3B9}"/>
+                <a16:creationId xmlns="" xmlns:a16="http://schemas.microsoft.com/office/drawing/2014/main" id="{3914DB82-8277-D770-D502-B5862CD3A3B9}"/>
               </a:ext>
             </a:extLst>
           </p:cNvPr>
@@ -12017,13 +11750,20 @@
     </p:spTree>
     <p:extLst>
       <p:ext uri="{BB962C8B-B14F-4D97-AF65-F5344CB8AC3E}">
-        <p14:creationId xmlns:p14="http://schemas.microsoft.com/office/powerpoint/2010/main" val="2171536828"/>
+        <p14:creationId xmlns="" xmlns:p14="http://schemas.microsoft.com/office/powerpoint/2010/main" val="2171536828"/>
       </p:ext>
     </p:extLst>
   </p:cSld>
   <p:clrMapOvr>
     <a:masterClrMapping/>
   </p:clrMapOvr>
+  <p:timing>
+    <p:tnLst>
+      <p:par>
+        <p:cTn id="1" dur="indefinite" restart="never" nodeType="tmRoot"/>
+      </p:par>
+    </p:tnLst>
+  </p:timing>
 </p:sld>
 </file>
 
@@ -12070,7 +11810,7 @@
     </a:clrScheme>
     <a:fontScheme name="Parallax">
       <a:majorFont>
-        <a:latin typeface="Corbel" panose="020B0503020204020204"/>
+        <a:latin typeface="Corbel"/>
         <a:ea typeface=""/>
         <a:cs typeface=""/>
         <a:font script="Jpan" typeface="HGｺﾞｼｯｸM"/>
@@ -12105,7 +11845,7 @@
         <a:font script="Geor" typeface="Sylfaen"/>
       </a:majorFont>
       <a:minorFont>
-        <a:latin typeface="Corbel" panose="020B0503020204020204"/>
+        <a:latin typeface="Corbel"/>
         <a:ea typeface=""/>
         <a:cs typeface=""/>
         <a:font script="Jpan" typeface="HGｺﾞｼｯｸM"/>
@@ -12277,7 +12017,7 @@
   <a:extraClrSchemeLst/>
   <a:extLst>
     <a:ext uri="{05A4C25C-085E-4340-85A3-A5531E510DB2}">
-      <thm15:themeFamily xmlns:thm15="http://schemas.microsoft.com/office/thememl/2012/main" name="Parallax" id="{3388167B-A2EB-4685-9635-1831D9AEF8C4}" vid="{4F7A876A-7598-49CA-AFC8-8EDA2551E4A7}"/>
+      <thm15:themeFamily xmlns="" xmlns:thm15="http://schemas.microsoft.com/office/thememl/2012/main" name="Parallax" id="{3388167B-A2EB-4685-9635-1831D9AEF8C4}" vid="{4F7A876A-7598-49CA-AFC8-8EDA2551E4A7}"/>
     </a:ext>
   </a:extLst>
 </a:theme>

</xml_diff>